<commit_message>
Mod 5 added slides to show completed labs, updated screen shots, Mod 7: added additional attribute levels slide 7.5, updated screen shots for correct number of examples, added lab solution slides
</commit_message>
<xml_diff>
--- a/05-faster_feedback_with_unit_testing.pptx
+++ b/05-faster_feedback_with_unit_testing.pptx
@@ -6,10 +6,10 @@
     <p:sldMasterId id="2147483847" r:id="rId6"/>
   </p:sldMasterIdLst>
   <p:notesMasterIdLst>
-    <p:notesMasterId r:id="rId48"/>
+    <p:notesMasterId r:id="rId53"/>
   </p:notesMasterIdLst>
   <p:handoutMasterIdLst>
-    <p:handoutMasterId r:id="rId49"/>
+    <p:handoutMasterId r:id="rId54"/>
   </p:handoutMasterIdLst>
   <p:sldIdLst>
     <p:sldId id="256" r:id="rId7"/>
@@ -48,11 +48,16 @@
     <p:sldId id="297" r:id="rId40"/>
     <p:sldId id="298" r:id="rId41"/>
     <p:sldId id="299" r:id="rId42"/>
-    <p:sldId id="312" r:id="rId43"/>
-    <p:sldId id="275" r:id="rId44"/>
-    <p:sldId id="276" r:id="rId45"/>
-    <p:sldId id="313" r:id="rId46"/>
-    <p:sldId id="267" r:id="rId47"/>
+    <p:sldId id="319" r:id="rId43"/>
+    <p:sldId id="318" r:id="rId44"/>
+    <p:sldId id="315" r:id="rId45"/>
+    <p:sldId id="316" r:id="rId46"/>
+    <p:sldId id="317" r:id="rId47"/>
+    <p:sldId id="312" r:id="rId48"/>
+    <p:sldId id="275" r:id="rId49"/>
+    <p:sldId id="276" r:id="rId50"/>
+    <p:sldId id="313" r:id="rId51"/>
+    <p:sldId id="267" r:id="rId52"/>
   </p:sldIdLst>
   <p:sldSz cx="16256000" cy="9144000"/>
   <p:notesSz cx="6858000" cy="9144000"/>
@@ -4778,46 +4783,13 @@
           <a:p>
             <a:r>
               <a:rPr lang="en-US" dirty="0"/>
-              <a:t>There</a:t>
+              <a:t>Restoring</a:t>
             </a:r>
             <a:r>
               <a:rPr lang="en-US" baseline="0" dirty="0"/>
-              <a:t> are more mutations that you could try within the default recipe and other recipe files that exist within the cookbook but this is a good point to stop and enjoy the work that you have accomplished.</a:t>
-            </a:r>
-          </a:p>
-          <a:p>
-            <a:endParaRPr lang="en-US" baseline="0" dirty="0"/>
-          </a:p>
-          <a:p>
-            <a:r>
-              <a:rPr lang="en-US" baseline="0" dirty="0"/>
-              <a:t>The feedback cycle on using </a:t>
-            </a:r>
-            <a:r>
-              <a:rPr lang="en-US" baseline="0" dirty="0" err="1"/>
-              <a:t>Rspec</a:t>
-            </a:r>
-            <a:r>
-              <a:rPr lang="en-US" baseline="0" dirty="0"/>
-              <a:t> to execute </a:t>
-            </a:r>
-            <a:r>
-              <a:rPr lang="en-US" baseline="0" dirty="0" err="1"/>
-              <a:t>ChefSpec</a:t>
-            </a:r>
-            <a:r>
-              <a:rPr lang="en-US" baseline="0" dirty="0"/>
-              <a:t> examples returns results faster than we saw with Test Kitchen and gives us a good understanding of what is being added to the 'Resource Collection'.</a:t>
-            </a:r>
-          </a:p>
-          <a:p>
-            <a:endParaRPr lang="en-US" baseline="0" dirty="0"/>
-          </a:p>
-          <a:p>
-            <a:r>
-              <a:rPr lang="en-US" baseline="0" dirty="0"/>
-              <a:t>Let's have a discussion.</a:t>
-            </a:r>
+              <a:t> the code to its previous state</a:t>
+            </a:r>
+            <a:endParaRPr lang="en-US" dirty="0"/>
           </a:p>
         </p:txBody>
       </p:sp>
@@ -4872,7 +4844,7 @@
     </p:spTree>
     <p:extLst>
       <p:ext uri="{BB962C8B-B14F-4D97-AF65-F5344CB8AC3E}">
-        <p14:creationId xmlns:p14="http://schemas.microsoft.com/office/powerpoint/2010/main" val="252104607"/>
+        <p14:creationId xmlns:p14="http://schemas.microsoft.com/office/powerpoint/2010/main" val="2431269351"/>
       </p:ext>
     </p:extLst>
   </p:cSld>
@@ -4926,30 +4898,14 @@
           <a:bodyPr/>
           <a:lstStyle/>
           <a:p>
-            <a:pPr marL="0" marR="0" indent="0" algn="l" defTabSz="1217613" rtl="0" eaLnBrk="1" fontAlgn="base" latinLnBrk="0" hangingPunct="1">
-              <a:lnSpc>
-                <a:spcPct val="90000"/>
-              </a:lnSpc>
-              <a:spcBef>
-                <a:spcPct val="30000"/>
-              </a:spcBef>
-              <a:spcAft>
-                <a:spcPts val="450"/>
-              </a:spcAft>
-              <a:buClrTx/>
-              <a:buSzTx/>
-              <a:buFontTx/>
-              <a:buNone/>
-              <a:tabLst/>
-              <a:defRPr/>
-            </a:pPr>
+            <a:r>
+              <a:rPr lang="en-US" dirty="0"/>
+              <a:t>Returning</a:t>
+            </a:r>
             <a:r>
               <a:rPr lang="en-US" baseline="0" dirty="0"/>
-              <a:t>Instructor Note: With large groups I often find it better to have individuals turn to the individuals around them, form groups of whatever size they feel comfortable, and have them take turns asking and answering the questions. When all the groups are done I then open the discussion up to the entire group allowing each group or individuals to share their answers.</a:t>
-            </a:r>
-            <a:endParaRPr lang="en-US" dirty="0"/>
-          </a:p>
-          <a:p>
+              <a:t> to the specification file to define the example and the new expectation.</a:t>
+            </a:r>
             <a:endParaRPr lang="en-US" dirty="0"/>
           </a:p>
         </p:txBody>
@@ -5005,7 +4961,7 @@
     </p:spTree>
     <p:extLst>
       <p:ext uri="{BB962C8B-B14F-4D97-AF65-F5344CB8AC3E}">
-        <p14:creationId xmlns:p14="http://schemas.microsoft.com/office/powerpoint/2010/main" val="1212017142"/>
+        <p14:creationId xmlns:p14="http://schemas.microsoft.com/office/powerpoint/2010/main" val="228178023"/>
       </p:ext>
     </p:extLst>
   </p:cSld>
@@ -5059,30 +5015,29 @@
           <a:bodyPr/>
           <a:lstStyle/>
           <a:p>
-            <a:pPr marL="0" marR="0" indent="0" algn="l" defTabSz="1217613" rtl="0" eaLnBrk="1" fontAlgn="base" latinLnBrk="0" hangingPunct="1">
-              <a:lnSpc>
-                <a:spcPct val="90000"/>
-              </a:lnSpc>
-              <a:spcBef>
-                <a:spcPct val="30000"/>
-              </a:spcBef>
-              <a:spcAft>
-                <a:spcPts val="450"/>
-              </a:spcAft>
-              <a:buClrTx/>
-              <a:buSzTx/>
-              <a:buFontTx/>
-              <a:buNone/>
-              <a:tabLst/>
-              <a:defRPr/>
-            </a:pPr>
-            <a:r>
-              <a:rPr lang="en-US" dirty="0"/>
-              <a:t>Before</a:t>
+            <a:r>
+              <a:rPr lang="en-US" dirty="0"/>
+              <a:t>Seeing the failure</a:t>
             </a:r>
             <a:r>
               <a:rPr lang="en-US" baseline="0" dirty="0"/>
-              <a:t> we complete this section, let us pause for questions.</a:t>
+              <a:t> when executing </a:t>
+            </a:r>
+            <a:r>
+              <a:rPr lang="en-US" baseline="0" dirty="0" err="1"/>
+              <a:t>te</a:t>
+            </a:r>
+            <a:r>
+              <a:rPr lang="en-US" baseline="0" dirty="0"/>
+              <a:t> '</a:t>
+            </a:r>
+            <a:r>
+              <a:rPr lang="en-US" baseline="0" dirty="0" err="1"/>
+              <a:t>rspec</a:t>
+            </a:r>
+            <a:r>
+              <a:rPr lang="en-US" baseline="0" dirty="0"/>
+              <a:t>' command.</a:t>
             </a:r>
             <a:endParaRPr lang="en-US" dirty="0"/>
           </a:p>
@@ -5139,7 +5094,7 @@
     </p:spTree>
     <p:extLst>
       <p:ext uri="{BB962C8B-B14F-4D97-AF65-F5344CB8AC3E}">
-        <p14:creationId xmlns:p14="http://schemas.microsoft.com/office/powerpoint/2010/main" val="1489713799"/>
+        <p14:creationId xmlns:p14="http://schemas.microsoft.com/office/powerpoint/2010/main" val="1595869895"/>
       </p:ext>
     </p:extLst>
   </p:cSld>
@@ -5270,6 +5225,665 @@
 </file>
 
 <file path=ppt/notesSlides/notesSlide40.xml><?xml version="1.0" encoding="utf-8"?>
+<p:notes xmlns:a="http://schemas.openxmlformats.org/drawingml/2006/main" xmlns:r="http://schemas.openxmlformats.org/officeDocument/2006/relationships" xmlns:p="http://schemas.openxmlformats.org/presentationml/2006/main">
+  <p:cSld>
+    <p:spTree>
+      <p:nvGrpSpPr>
+        <p:cNvPr id="1" name=""/>
+        <p:cNvGrpSpPr/>
+        <p:nvPr/>
+      </p:nvGrpSpPr>
+      <p:grpSpPr>
+        <a:xfrm>
+          <a:off x="0" y="0"/>
+          <a:ext cx="0" cy="0"/>
+          <a:chOff x="0" y="0"/>
+          <a:chExt cx="0" cy="0"/>
+        </a:xfrm>
+      </p:grpSpPr>
+      <p:sp>
+        <p:nvSpPr>
+          <p:cNvPr id="2" name="Slide Image Placeholder 1"/>
+          <p:cNvSpPr>
+            <a:spLocks noGrp="1" noRot="1" noChangeAspect="1"/>
+          </p:cNvSpPr>
+          <p:nvPr>
+            <p:ph type="sldImg"/>
+          </p:nvPr>
+        </p:nvSpPr>
+        <p:spPr/>
+      </p:sp>
+      <p:sp>
+        <p:nvSpPr>
+          <p:cNvPr id="3" name="Notes Placeholder 2"/>
+          <p:cNvSpPr>
+            <a:spLocks noGrp="1"/>
+          </p:cNvSpPr>
+          <p:nvPr>
+            <p:ph type="body" idx="1"/>
+          </p:nvPr>
+        </p:nvSpPr>
+        <p:spPr/>
+        <p:txBody>
+          <a:bodyPr/>
+          <a:lstStyle/>
+          <a:p>
+            <a:r>
+              <a:rPr lang="en-US" dirty="0"/>
+              <a:t>Restoring</a:t>
+            </a:r>
+            <a:r>
+              <a:rPr lang="en-US" baseline="0" dirty="0"/>
+              <a:t> the code to its previous state</a:t>
+            </a:r>
+            <a:endParaRPr lang="en-US" dirty="0"/>
+          </a:p>
+        </p:txBody>
+      </p:sp>
+      <p:sp>
+        <p:nvSpPr>
+          <p:cNvPr id="5" name="Header Placeholder 4"/>
+          <p:cNvSpPr>
+            <a:spLocks noGrp="1"/>
+          </p:cNvSpPr>
+          <p:nvPr>
+            <p:ph type="hdr" sz="quarter" idx="11"/>
+          </p:nvPr>
+        </p:nvSpPr>
+        <p:spPr/>
+        <p:txBody>
+          <a:bodyPr/>
+          <a:lstStyle/>
+          <a:p>
+            <a:r>
+              <a:rPr lang="en-US"/>
+              <a:t>Chef Intermediate</a:t>
+            </a:r>
+          </a:p>
+        </p:txBody>
+      </p:sp>
+      <p:sp>
+        <p:nvSpPr>
+          <p:cNvPr id="7" name="Date Placeholder 6"/>
+          <p:cNvSpPr>
+            <a:spLocks noGrp="1"/>
+          </p:cNvSpPr>
+          <p:nvPr>
+            <p:ph type="dt" idx="13"/>
+          </p:nvPr>
+        </p:nvSpPr>
+        <p:spPr/>
+        <p:txBody>
+          <a:bodyPr/>
+          <a:lstStyle/>
+          <a:p>
+            <a:pPr>
+              <a:defRPr/>
+            </a:pPr>
+            <a:r>
+              <a:rPr lang="en-US"/>
+              <a:t>Chef Software, Inc.</a:t>
+            </a:r>
+            <a:endParaRPr lang="en-US" dirty="0"/>
+          </a:p>
+        </p:txBody>
+      </p:sp>
+    </p:spTree>
+    <p:extLst>
+      <p:ext uri="{BB962C8B-B14F-4D97-AF65-F5344CB8AC3E}">
+        <p14:creationId xmlns:p14="http://schemas.microsoft.com/office/powerpoint/2010/main" val="2816804928"/>
+      </p:ext>
+    </p:extLst>
+  </p:cSld>
+  <p:clrMapOvr>
+    <a:masterClrMapping/>
+  </p:clrMapOvr>
+</p:notes>
+</file>
+
+<file path=ppt/notesSlides/notesSlide41.xml><?xml version="1.0" encoding="utf-8"?>
+<p:notes xmlns:a="http://schemas.openxmlformats.org/drawingml/2006/main" xmlns:r="http://schemas.openxmlformats.org/officeDocument/2006/relationships" xmlns:p="http://schemas.openxmlformats.org/presentationml/2006/main">
+  <p:cSld>
+    <p:spTree>
+      <p:nvGrpSpPr>
+        <p:cNvPr id="1" name=""/>
+        <p:cNvGrpSpPr/>
+        <p:nvPr/>
+      </p:nvGrpSpPr>
+      <p:grpSpPr>
+        <a:xfrm>
+          <a:off x="0" y="0"/>
+          <a:ext cx="0" cy="0"/>
+          <a:chOff x="0" y="0"/>
+          <a:chExt cx="0" cy="0"/>
+        </a:xfrm>
+      </p:grpSpPr>
+      <p:sp>
+        <p:nvSpPr>
+          <p:cNvPr id="2" name="Slide Image Placeholder 1"/>
+          <p:cNvSpPr>
+            <a:spLocks noGrp="1" noRot="1" noChangeAspect="1"/>
+          </p:cNvSpPr>
+          <p:nvPr>
+            <p:ph type="sldImg"/>
+          </p:nvPr>
+        </p:nvSpPr>
+        <p:spPr/>
+      </p:sp>
+      <p:sp>
+        <p:nvSpPr>
+          <p:cNvPr id="3" name="Notes Placeholder 2"/>
+          <p:cNvSpPr>
+            <a:spLocks noGrp="1"/>
+          </p:cNvSpPr>
+          <p:nvPr>
+            <p:ph type="body" idx="1"/>
+          </p:nvPr>
+        </p:nvSpPr>
+        <p:spPr/>
+        <p:txBody>
+          <a:bodyPr/>
+          <a:lstStyle/>
+          <a:p>
+            <a:r>
+              <a:rPr lang="en-US" dirty="0"/>
+              <a:t>Executing</a:t>
+            </a:r>
+            <a:r>
+              <a:rPr lang="en-US" baseline="0" dirty="0"/>
+              <a:t> '</a:t>
+            </a:r>
+            <a:r>
+              <a:rPr lang="en-US" baseline="0" dirty="0" err="1"/>
+              <a:t>rspec</a:t>
+            </a:r>
+            <a:r>
+              <a:rPr lang="en-US" baseline="0" dirty="0"/>
+              <a:t>' again to verify that the expectations have been met successfully</a:t>
+            </a:r>
+            <a:endParaRPr lang="en-US" dirty="0"/>
+          </a:p>
+        </p:txBody>
+      </p:sp>
+      <p:sp>
+        <p:nvSpPr>
+          <p:cNvPr id="5" name="Header Placeholder 4"/>
+          <p:cNvSpPr>
+            <a:spLocks noGrp="1"/>
+          </p:cNvSpPr>
+          <p:nvPr>
+            <p:ph type="hdr" sz="quarter" idx="11"/>
+          </p:nvPr>
+        </p:nvSpPr>
+        <p:spPr/>
+        <p:txBody>
+          <a:bodyPr/>
+          <a:lstStyle/>
+          <a:p>
+            <a:r>
+              <a:rPr lang="en-US"/>
+              <a:t>Chef Intermediate</a:t>
+            </a:r>
+          </a:p>
+        </p:txBody>
+      </p:sp>
+      <p:sp>
+        <p:nvSpPr>
+          <p:cNvPr id="7" name="Date Placeholder 6"/>
+          <p:cNvSpPr>
+            <a:spLocks noGrp="1"/>
+          </p:cNvSpPr>
+          <p:nvPr>
+            <p:ph type="dt" idx="13"/>
+          </p:nvPr>
+        </p:nvSpPr>
+        <p:spPr/>
+        <p:txBody>
+          <a:bodyPr/>
+          <a:lstStyle/>
+          <a:p>
+            <a:pPr>
+              <a:defRPr/>
+            </a:pPr>
+            <a:r>
+              <a:rPr lang="en-US"/>
+              <a:t>Chef Software, Inc.</a:t>
+            </a:r>
+            <a:endParaRPr lang="en-US" dirty="0"/>
+          </a:p>
+        </p:txBody>
+      </p:sp>
+    </p:spTree>
+    <p:extLst>
+      <p:ext uri="{BB962C8B-B14F-4D97-AF65-F5344CB8AC3E}">
+        <p14:creationId xmlns:p14="http://schemas.microsoft.com/office/powerpoint/2010/main" val="2780698185"/>
+      </p:ext>
+    </p:extLst>
+  </p:cSld>
+  <p:clrMapOvr>
+    <a:masterClrMapping/>
+  </p:clrMapOvr>
+</p:notes>
+</file>
+
+<file path=ppt/notesSlides/notesSlide42.xml><?xml version="1.0" encoding="utf-8"?>
+<p:notes xmlns:a="http://schemas.openxmlformats.org/drawingml/2006/main" xmlns:r="http://schemas.openxmlformats.org/officeDocument/2006/relationships" xmlns:p="http://schemas.openxmlformats.org/presentationml/2006/main">
+  <p:cSld>
+    <p:spTree>
+      <p:nvGrpSpPr>
+        <p:cNvPr id="1" name=""/>
+        <p:cNvGrpSpPr/>
+        <p:nvPr/>
+      </p:nvGrpSpPr>
+      <p:grpSpPr>
+        <a:xfrm>
+          <a:off x="0" y="0"/>
+          <a:ext cx="0" cy="0"/>
+          <a:chOff x="0" y="0"/>
+          <a:chExt cx="0" cy="0"/>
+        </a:xfrm>
+      </p:grpSpPr>
+      <p:sp>
+        <p:nvSpPr>
+          <p:cNvPr id="2" name="Slide Image Placeholder 1"/>
+          <p:cNvSpPr>
+            <a:spLocks noGrp="1" noRot="1" noChangeAspect="1"/>
+          </p:cNvSpPr>
+          <p:nvPr>
+            <p:ph type="sldImg"/>
+          </p:nvPr>
+        </p:nvSpPr>
+        <p:spPr/>
+      </p:sp>
+      <p:sp>
+        <p:nvSpPr>
+          <p:cNvPr id="3" name="Notes Placeholder 2"/>
+          <p:cNvSpPr>
+            <a:spLocks noGrp="1"/>
+          </p:cNvSpPr>
+          <p:nvPr>
+            <p:ph type="body" idx="1"/>
+          </p:nvPr>
+        </p:nvSpPr>
+        <p:spPr/>
+        <p:txBody>
+          <a:bodyPr/>
+          <a:lstStyle/>
+          <a:p>
+            <a:r>
+              <a:rPr lang="en-US" dirty="0"/>
+              <a:t>There</a:t>
+            </a:r>
+            <a:r>
+              <a:rPr lang="en-US" baseline="0" dirty="0"/>
+              <a:t> are more mutations that you could try within the default recipe and other recipe files that exist within the cookbook but this is a good point to stop and enjoy the work that you have accomplished.</a:t>
+            </a:r>
+          </a:p>
+          <a:p>
+            <a:endParaRPr lang="en-US" baseline="0" dirty="0"/>
+          </a:p>
+          <a:p>
+            <a:r>
+              <a:rPr lang="en-US" baseline="0" dirty="0"/>
+              <a:t>The feedback cycle on using </a:t>
+            </a:r>
+            <a:r>
+              <a:rPr lang="en-US" baseline="0" dirty="0" err="1"/>
+              <a:t>Rspec</a:t>
+            </a:r>
+            <a:r>
+              <a:rPr lang="en-US" baseline="0" dirty="0"/>
+              <a:t> to execute </a:t>
+            </a:r>
+            <a:r>
+              <a:rPr lang="en-US" baseline="0" dirty="0" err="1"/>
+              <a:t>ChefSpec</a:t>
+            </a:r>
+            <a:r>
+              <a:rPr lang="en-US" baseline="0" dirty="0"/>
+              <a:t> examples returns results faster than we saw with Test Kitchen and gives us a good understanding of what is being added to the 'Resource Collection'.</a:t>
+            </a:r>
+          </a:p>
+          <a:p>
+            <a:endParaRPr lang="en-US" baseline="0" dirty="0"/>
+          </a:p>
+          <a:p>
+            <a:r>
+              <a:rPr lang="en-US" baseline="0" dirty="0"/>
+              <a:t>Let's have a discussion.</a:t>
+            </a:r>
+          </a:p>
+        </p:txBody>
+      </p:sp>
+      <p:sp>
+        <p:nvSpPr>
+          <p:cNvPr id="5" name="Header Placeholder 4"/>
+          <p:cNvSpPr>
+            <a:spLocks noGrp="1"/>
+          </p:cNvSpPr>
+          <p:nvPr>
+            <p:ph type="hdr" sz="quarter" idx="11"/>
+          </p:nvPr>
+        </p:nvSpPr>
+        <p:spPr/>
+        <p:txBody>
+          <a:bodyPr/>
+          <a:lstStyle/>
+          <a:p>
+            <a:r>
+              <a:rPr lang="en-US"/>
+              <a:t>Chef Intermediate</a:t>
+            </a:r>
+          </a:p>
+        </p:txBody>
+      </p:sp>
+      <p:sp>
+        <p:nvSpPr>
+          <p:cNvPr id="7" name="Date Placeholder 6"/>
+          <p:cNvSpPr>
+            <a:spLocks noGrp="1"/>
+          </p:cNvSpPr>
+          <p:nvPr>
+            <p:ph type="dt" idx="13"/>
+          </p:nvPr>
+        </p:nvSpPr>
+        <p:spPr/>
+        <p:txBody>
+          <a:bodyPr/>
+          <a:lstStyle/>
+          <a:p>
+            <a:pPr>
+              <a:defRPr/>
+            </a:pPr>
+            <a:r>
+              <a:rPr lang="en-US"/>
+              <a:t>Chef Software, Inc.</a:t>
+            </a:r>
+            <a:endParaRPr lang="en-US" dirty="0"/>
+          </a:p>
+        </p:txBody>
+      </p:sp>
+    </p:spTree>
+    <p:extLst>
+      <p:ext uri="{BB962C8B-B14F-4D97-AF65-F5344CB8AC3E}">
+        <p14:creationId xmlns:p14="http://schemas.microsoft.com/office/powerpoint/2010/main" val="252104607"/>
+      </p:ext>
+    </p:extLst>
+  </p:cSld>
+  <p:clrMapOvr>
+    <a:masterClrMapping/>
+  </p:clrMapOvr>
+</p:notes>
+</file>
+
+<file path=ppt/notesSlides/notesSlide43.xml><?xml version="1.0" encoding="utf-8"?>
+<p:notes xmlns:a="http://schemas.openxmlformats.org/drawingml/2006/main" xmlns:r="http://schemas.openxmlformats.org/officeDocument/2006/relationships" xmlns:p="http://schemas.openxmlformats.org/presentationml/2006/main">
+  <p:cSld>
+    <p:spTree>
+      <p:nvGrpSpPr>
+        <p:cNvPr id="1" name=""/>
+        <p:cNvGrpSpPr/>
+        <p:nvPr/>
+      </p:nvGrpSpPr>
+      <p:grpSpPr>
+        <a:xfrm>
+          <a:off x="0" y="0"/>
+          <a:ext cx="0" cy="0"/>
+          <a:chOff x="0" y="0"/>
+          <a:chExt cx="0" cy="0"/>
+        </a:xfrm>
+      </p:grpSpPr>
+      <p:sp>
+        <p:nvSpPr>
+          <p:cNvPr id="2" name="Slide Image Placeholder 1"/>
+          <p:cNvSpPr>
+            <a:spLocks noGrp="1" noRot="1" noChangeAspect="1"/>
+          </p:cNvSpPr>
+          <p:nvPr>
+            <p:ph type="sldImg"/>
+          </p:nvPr>
+        </p:nvSpPr>
+        <p:spPr/>
+      </p:sp>
+      <p:sp>
+        <p:nvSpPr>
+          <p:cNvPr id="3" name="Notes Placeholder 2"/>
+          <p:cNvSpPr>
+            <a:spLocks noGrp="1"/>
+          </p:cNvSpPr>
+          <p:nvPr>
+            <p:ph type="body" idx="1"/>
+          </p:nvPr>
+        </p:nvSpPr>
+        <p:spPr/>
+        <p:txBody>
+          <a:bodyPr/>
+          <a:lstStyle/>
+          <a:p>
+            <a:pPr marL="0" marR="0" indent="0" algn="l" defTabSz="1217613" rtl="0" eaLnBrk="1" fontAlgn="base" latinLnBrk="0" hangingPunct="1">
+              <a:lnSpc>
+                <a:spcPct val="90000"/>
+              </a:lnSpc>
+              <a:spcBef>
+                <a:spcPct val="30000"/>
+              </a:spcBef>
+              <a:spcAft>
+                <a:spcPts val="450"/>
+              </a:spcAft>
+              <a:buClrTx/>
+              <a:buSzTx/>
+              <a:buFontTx/>
+              <a:buNone/>
+              <a:tabLst/>
+              <a:defRPr/>
+            </a:pPr>
+            <a:r>
+              <a:rPr lang="en-US" baseline="0" dirty="0"/>
+              <a:t>Instructor Note: With large groups I often find it better to have individuals turn to the individuals around them, form groups of whatever size they feel comfortable, and have them take turns asking and answering the questions. When all the groups are done I then open the discussion up to the entire group allowing each group or individuals to share their answers.</a:t>
+            </a:r>
+            <a:endParaRPr lang="en-US" dirty="0"/>
+          </a:p>
+          <a:p>
+            <a:endParaRPr lang="en-US" dirty="0"/>
+          </a:p>
+        </p:txBody>
+      </p:sp>
+      <p:sp>
+        <p:nvSpPr>
+          <p:cNvPr id="5" name="Header Placeholder 4"/>
+          <p:cNvSpPr>
+            <a:spLocks noGrp="1"/>
+          </p:cNvSpPr>
+          <p:nvPr>
+            <p:ph type="hdr" sz="quarter" idx="11"/>
+          </p:nvPr>
+        </p:nvSpPr>
+        <p:spPr/>
+        <p:txBody>
+          <a:bodyPr/>
+          <a:lstStyle/>
+          <a:p>
+            <a:r>
+              <a:rPr lang="en-US"/>
+              <a:t>Chef Intermediate</a:t>
+            </a:r>
+          </a:p>
+        </p:txBody>
+      </p:sp>
+      <p:sp>
+        <p:nvSpPr>
+          <p:cNvPr id="7" name="Date Placeholder 6"/>
+          <p:cNvSpPr>
+            <a:spLocks noGrp="1"/>
+          </p:cNvSpPr>
+          <p:nvPr>
+            <p:ph type="dt" idx="13"/>
+          </p:nvPr>
+        </p:nvSpPr>
+        <p:spPr/>
+        <p:txBody>
+          <a:bodyPr/>
+          <a:lstStyle/>
+          <a:p>
+            <a:pPr>
+              <a:defRPr/>
+            </a:pPr>
+            <a:r>
+              <a:rPr lang="en-US"/>
+              <a:t>Chef Software, Inc.</a:t>
+            </a:r>
+            <a:endParaRPr lang="en-US" dirty="0"/>
+          </a:p>
+        </p:txBody>
+      </p:sp>
+    </p:spTree>
+    <p:extLst>
+      <p:ext uri="{BB962C8B-B14F-4D97-AF65-F5344CB8AC3E}">
+        <p14:creationId xmlns:p14="http://schemas.microsoft.com/office/powerpoint/2010/main" val="1212017142"/>
+      </p:ext>
+    </p:extLst>
+  </p:cSld>
+  <p:clrMapOvr>
+    <a:masterClrMapping/>
+  </p:clrMapOvr>
+</p:notes>
+</file>
+
+<file path=ppt/notesSlides/notesSlide44.xml><?xml version="1.0" encoding="utf-8"?>
+<p:notes xmlns:a="http://schemas.openxmlformats.org/drawingml/2006/main" xmlns:r="http://schemas.openxmlformats.org/officeDocument/2006/relationships" xmlns:p="http://schemas.openxmlformats.org/presentationml/2006/main">
+  <p:cSld>
+    <p:spTree>
+      <p:nvGrpSpPr>
+        <p:cNvPr id="1" name=""/>
+        <p:cNvGrpSpPr/>
+        <p:nvPr/>
+      </p:nvGrpSpPr>
+      <p:grpSpPr>
+        <a:xfrm>
+          <a:off x="0" y="0"/>
+          <a:ext cx="0" cy="0"/>
+          <a:chOff x="0" y="0"/>
+          <a:chExt cx="0" cy="0"/>
+        </a:xfrm>
+      </p:grpSpPr>
+      <p:sp>
+        <p:nvSpPr>
+          <p:cNvPr id="2" name="Slide Image Placeholder 1"/>
+          <p:cNvSpPr>
+            <a:spLocks noGrp="1" noRot="1" noChangeAspect="1"/>
+          </p:cNvSpPr>
+          <p:nvPr>
+            <p:ph type="sldImg"/>
+          </p:nvPr>
+        </p:nvSpPr>
+        <p:spPr/>
+      </p:sp>
+      <p:sp>
+        <p:nvSpPr>
+          <p:cNvPr id="3" name="Notes Placeholder 2"/>
+          <p:cNvSpPr>
+            <a:spLocks noGrp="1"/>
+          </p:cNvSpPr>
+          <p:nvPr>
+            <p:ph type="body" idx="1"/>
+          </p:nvPr>
+        </p:nvSpPr>
+        <p:spPr/>
+        <p:txBody>
+          <a:bodyPr/>
+          <a:lstStyle/>
+          <a:p>
+            <a:pPr marL="0" marR="0" indent="0" algn="l" defTabSz="1217613" rtl="0" eaLnBrk="1" fontAlgn="base" latinLnBrk="0" hangingPunct="1">
+              <a:lnSpc>
+                <a:spcPct val="90000"/>
+              </a:lnSpc>
+              <a:spcBef>
+                <a:spcPct val="30000"/>
+              </a:spcBef>
+              <a:spcAft>
+                <a:spcPts val="450"/>
+              </a:spcAft>
+              <a:buClrTx/>
+              <a:buSzTx/>
+              <a:buFontTx/>
+              <a:buNone/>
+              <a:tabLst/>
+              <a:defRPr/>
+            </a:pPr>
+            <a:r>
+              <a:rPr lang="en-US" dirty="0"/>
+              <a:t>Before</a:t>
+            </a:r>
+            <a:r>
+              <a:rPr lang="en-US" baseline="0" dirty="0"/>
+              <a:t> we complete this section, let us pause for questions.</a:t>
+            </a:r>
+            <a:endParaRPr lang="en-US" dirty="0"/>
+          </a:p>
+        </p:txBody>
+      </p:sp>
+      <p:sp>
+        <p:nvSpPr>
+          <p:cNvPr id="5" name="Header Placeholder 4"/>
+          <p:cNvSpPr>
+            <a:spLocks noGrp="1"/>
+          </p:cNvSpPr>
+          <p:nvPr>
+            <p:ph type="hdr" sz="quarter" idx="11"/>
+          </p:nvPr>
+        </p:nvSpPr>
+        <p:spPr/>
+        <p:txBody>
+          <a:bodyPr/>
+          <a:lstStyle/>
+          <a:p>
+            <a:r>
+              <a:rPr lang="en-US"/>
+              <a:t>Chef Intermediate</a:t>
+            </a:r>
+          </a:p>
+        </p:txBody>
+      </p:sp>
+      <p:sp>
+        <p:nvSpPr>
+          <p:cNvPr id="7" name="Date Placeholder 6"/>
+          <p:cNvSpPr>
+            <a:spLocks noGrp="1"/>
+          </p:cNvSpPr>
+          <p:nvPr>
+            <p:ph type="dt" idx="13"/>
+          </p:nvPr>
+        </p:nvSpPr>
+        <p:spPr/>
+        <p:txBody>
+          <a:bodyPr/>
+          <a:lstStyle/>
+          <a:p>
+            <a:pPr>
+              <a:defRPr/>
+            </a:pPr>
+            <a:r>
+              <a:rPr lang="en-US"/>
+              <a:t>Chef Software, Inc.</a:t>
+            </a:r>
+            <a:endParaRPr lang="en-US" dirty="0"/>
+          </a:p>
+        </p:txBody>
+      </p:sp>
+    </p:spTree>
+    <p:extLst>
+      <p:ext uri="{BB962C8B-B14F-4D97-AF65-F5344CB8AC3E}">
+        <p14:creationId xmlns:p14="http://schemas.microsoft.com/office/powerpoint/2010/main" val="1489713799"/>
+      </p:ext>
+    </p:extLst>
+  </p:cSld>
+  <p:clrMapOvr>
+    <a:masterClrMapping/>
+  </p:clrMapOvr>
+</p:notes>
+</file>
+
+<file path=ppt/notesSlides/notesSlide45.xml><?xml version="1.0" encoding="utf-8"?>
 <p:notes xmlns:a="http://schemas.openxmlformats.org/drawingml/2006/main" xmlns:r="http://schemas.openxmlformats.org/officeDocument/2006/relationships" xmlns:p="http://schemas.openxmlformats.org/presentationml/2006/main">
   <p:cSld>
     <p:spTree>
@@ -6623,14 +7237,14 @@
           </a:ln>
           <a:extLst>
             <a:ext uri="{909E8E84-426E-40dd-AFC4-6F175D3DCCD1}">
-              <a14:hiddenFill xmlns:a14="http://schemas.microsoft.com/office/drawing/2010/main" xmlns="">
+              <a14:hiddenFill xmlns="" xmlns:a14="http://schemas.microsoft.com/office/drawing/2010/main">
                 <a:solidFill>
                   <a:srgbClr val="FFFFFF"/>
                 </a:solidFill>
               </a14:hiddenFill>
             </a:ext>
             <a:ext uri="{91240B29-F687-4f45-9708-019B960494DF}">
-              <a14:hiddenLine xmlns:a14="http://schemas.microsoft.com/office/drawing/2010/main" xmlns="" w="9525">
+              <a14:hiddenLine xmlns="" xmlns:a14="http://schemas.microsoft.com/office/drawing/2010/main" w="9525">
                 <a:solidFill>
                   <a:srgbClr val="000000"/>
                 </a:solidFill>
@@ -6778,14 +7392,14 @@
           </a:ln>
           <a:extLst>
             <a:ext uri="{909E8E84-426E-40dd-AFC4-6F175D3DCCD1}">
-              <a14:hiddenFill xmlns:a14="http://schemas.microsoft.com/office/drawing/2010/main" xmlns="">
+              <a14:hiddenFill xmlns="" xmlns:a14="http://schemas.microsoft.com/office/drawing/2010/main">
                 <a:solidFill>
                   <a:srgbClr val="FFFFFF"/>
                 </a:solidFill>
               </a14:hiddenFill>
             </a:ext>
             <a:ext uri="{91240B29-F687-4f45-9708-019B960494DF}">
-              <a14:hiddenLine xmlns:a14="http://schemas.microsoft.com/office/drawing/2010/main" xmlns="" w="9525">
+              <a14:hiddenLine xmlns="" xmlns:a14="http://schemas.microsoft.com/office/drawing/2010/main" w="9525">
                 <a:solidFill>
                   <a:srgbClr val="000000"/>
                 </a:solidFill>
@@ -7276,14 +7890,14 @@
           </a:ln>
           <a:extLst>
             <a:ext uri="{909E8E84-426E-40dd-AFC4-6F175D3DCCD1}">
-              <a14:hiddenFill xmlns:a14="http://schemas.microsoft.com/office/drawing/2010/main" xmlns="">
+              <a14:hiddenFill xmlns="" xmlns:a14="http://schemas.microsoft.com/office/drawing/2010/main">
                 <a:solidFill>
                   <a:srgbClr val="FFFFFF"/>
                 </a:solidFill>
               </a14:hiddenFill>
             </a:ext>
             <a:ext uri="{91240B29-F687-4f45-9708-019B960494DF}">
-              <a14:hiddenLine xmlns:a14="http://schemas.microsoft.com/office/drawing/2010/main" xmlns="" w="9525">
+              <a14:hiddenLine xmlns="" xmlns:a14="http://schemas.microsoft.com/office/drawing/2010/main" w="9525">
                 <a:solidFill>
                   <a:srgbClr val="000000"/>
                 </a:solidFill>
@@ -8710,14 +9324,14 @@
           </a:ln>
           <a:extLst>
             <a:ext uri="{909E8E84-426E-40dd-AFC4-6F175D3DCCD1}">
-              <a14:hiddenFill xmlns:a14="http://schemas.microsoft.com/office/drawing/2010/main" xmlns="">
+              <a14:hiddenFill xmlns="" xmlns:a14="http://schemas.microsoft.com/office/drawing/2010/main">
                 <a:solidFill>
                   <a:srgbClr val="FFFFFF"/>
                 </a:solidFill>
               </a14:hiddenFill>
             </a:ext>
             <a:ext uri="{91240B29-F687-4f45-9708-019B960494DF}">
-              <a14:hiddenLine xmlns:a14="http://schemas.microsoft.com/office/drawing/2010/main" xmlns="" w="9525">
+              <a14:hiddenLine xmlns="" xmlns:a14="http://schemas.microsoft.com/office/drawing/2010/main" w="9525">
                 <a:solidFill>
                   <a:srgbClr val="000000"/>
                 </a:solidFill>
@@ -10051,14 +10665,14 @@
           </a:ln>
           <a:extLst>
             <a:ext uri="{909E8E84-426E-40dd-AFC4-6F175D3DCCD1}">
-              <a14:hiddenFill xmlns:a14="http://schemas.microsoft.com/office/drawing/2010/main" xmlns="">
+              <a14:hiddenFill xmlns="" xmlns:a14="http://schemas.microsoft.com/office/drawing/2010/main">
                 <a:solidFill>
                   <a:srgbClr val="FFFFFF"/>
                 </a:solidFill>
               </a14:hiddenFill>
             </a:ext>
             <a:ext uri="{91240B29-F687-4f45-9708-019B960494DF}">
-              <a14:hiddenLine xmlns:a14="http://schemas.microsoft.com/office/drawing/2010/main" xmlns="" w="9525">
+              <a14:hiddenLine xmlns="" xmlns:a14="http://schemas.microsoft.com/office/drawing/2010/main" w="9525">
                 <a:solidFill>
                   <a:srgbClr val="000000"/>
                 </a:solidFill>
@@ -10616,14 +11230,14 @@
           </a:ln>
           <a:extLst>
             <a:ext uri="{909E8E84-426E-40dd-AFC4-6F175D3DCCD1}">
-              <a14:hiddenFill xmlns:a14="http://schemas.microsoft.com/office/drawing/2010/main" xmlns="">
+              <a14:hiddenFill xmlns="" xmlns:a14="http://schemas.microsoft.com/office/drawing/2010/main">
                 <a:solidFill>
                   <a:srgbClr val="FFFFFF"/>
                 </a:solidFill>
               </a14:hiddenFill>
             </a:ext>
             <a:ext uri="{91240B29-F687-4f45-9708-019B960494DF}">
-              <a14:hiddenLine xmlns:a14="http://schemas.microsoft.com/office/drawing/2010/main" xmlns="" w="9525">
+              <a14:hiddenLine xmlns="" xmlns:a14="http://schemas.microsoft.com/office/drawing/2010/main" w="9525">
                 <a:solidFill>
                   <a:srgbClr val="000000"/>
                 </a:solidFill>
@@ -11190,14 +11804,14 @@
           </a:ln>
           <a:extLst>
             <a:ext uri="{909E8E84-426E-40dd-AFC4-6F175D3DCCD1}">
-              <a14:hiddenFill xmlns:a14="http://schemas.microsoft.com/office/drawing/2010/main" xmlns="">
+              <a14:hiddenFill xmlns="" xmlns:a14="http://schemas.microsoft.com/office/drawing/2010/main">
                 <a:solidFill>
                   <a:srgbClr val="FFFFFF"/>
                 </a:solidFill>
               </a14:hiddenFill>
             </a:ext>
             <a:ext uri="{91240B29-F687-4f45-9708-019B960494DF}">
-              <a14:hiddenLine xmlns:a14="http://schemas.microsoft.com/office/drawing/2010/main" xmlns="" w="9525">
+              <a14:hiddenLine xmlns="" xmlns:a14="http://schemas.microsoft.com/office/drawing/2010/main" w="9525">
                 <a:solidFill>
                   <a:srgbClr val="000000"/>
                 </a:solidFill>
@@ -12137,14 +12751,14 @@
           </a:ln>
           <a:extLst>
             <a:ext uri="{909E8E84-426E-40dd-AFC4-6F175D3DCCD1}">
-              <a14:hiddenFill xmlns:a14="http://schemas.microsoft.com/office/drawing/2010/main" xmlns="">
+              <a14:hiddenFill xmlns="" xmlns:a14="http://schemas.microsoft.com/office/drawing/2010/main">
                 <a:solidFill>
                   <a:srgbClr val="FFFFFF"/>
                 </a:solidFill>
               </a14:hiddenFill>
             </a:ext>
             <a:ext uri="{91240B29-F687-4f45-9708-019B960494DF}">
-              <a14:hiddenLine xmlns:a14="http://schemas.microsoft.com/office/drawing/2010/main" xmlns="" w="9525">
+              <a14:hiddenLine xmlns="" xmlns:a14="http://schemas.microsoft.com/office/drawing/2010/main" w="9525">
                 <a:solidFill>
                   <a:srgbClr val="000000"/>
                 </a:solidFill>
@@ -12899,14 +13513,14 @@
           </a:ln>
           <a:extLst>
             <a:ext uri="{909E8E84-426E-40dd-AFC4-6F175D3DCCD1}">
-              <a14:hiddenFill xmlns:a14="http://schemas.microsoft.com/office/drawing/2010/main" xmlns="">
+              <a14:hiddenFill xmlns="" xmlns:a14="http://schemas.microsoft.com/office/drawing/2010/main">
                 <a:solidFill>
                   <a:srgbClr val="FFFFFF"/>
                 </a:solidFill>
               </a14:hiddenFill>
             </a:ext>
             <a:ext uri="{91240B29-F687-4f45-9708-019B960494DF}">
-              <a14:hiddenLine xmlns:a14="http://schemas.microsoft.com/office/drawing/2010/main" xmlns="" w="9525">
+              <a14:hiddenLine xmlns="" xmlns:a14="http://schemas.microsoft.com/office/drawing/2010/main" w="9525">
                 <a:solidFill>
                   <a:srgbClr val="000000"/>
                 </a:solidFill>
@@ -21702,7 +22316,7 @@
           <a:p>
             <a:r>
               <a:rPr lang="en-US" dirty="0"/>
-              <a:t>Uncomment the Include Recipe</a:t>
+              <a:t>Comment the Include Recipe</a:t>
             </a:r>
           </a:p>
         </p:txBody>
@@ -22138,7 +22752,7 @@
           <a:p>
             <a:r>
               <a:rPr lang="en-US" dirty="0"/>
-              <a:t>  1) apache::default When all attributes are default, on an CentOS 6.9 includes the service recipe</a:t>
+              <a:t>  1) apache::default When all attributes are default, on an Centos 6.9 includes the configuration recipe</a:t>
             </a:r>
           </a:p>
           <a:p>
@@ -22166,13 +22780,13 @@
           <a:p>
             <a:r>
               <a:rPr lang="en-US" dirty="0"/>
-              <a:t>       expected ["apache::default", "apache::install"] to include "apache::configuration"</a:t>
-            </a:r>
-          </a:p>
-          <a:p>
-            <a:r>
-              <a:rPr lang="en-US" dirty="0"/>
-              <a:t>     # ./spec/unit/recipes/default_spec.rb:25:in `block (3 levels)</a:t>
+              <a:t>       expected ["apache::default", "apache::install", "apache::service"] to include "apache::configuration"</a:t>
+            </a:r>
+          </a:p>
+          <a:p>
+            <a:r>
+              <a:rPr lang="en-US" dirty="0"/>
+              <a:t>     # ./spec/unit/recipes/default_spec.rb:27:in `block (3 levels) in </a:t>
             </a:r>
           </a:p>
         </p:txBody>
@@ -22643,31 +23257,29 @@
             <a:spLocks noGrp="1"/>
           </p:cNvSpPr>
           <p:nvPr>
-            <p:ph type="ctrTitle"/>
+            <p:ph type="title"/>
           </p:nvPr>
         </p:nvSpPr>
         <p:spPr/>
         <p:txBody>
-          <a:bodyPr>
-            <a:normAutofit fontScale="90000"/>
-          </a:bodyPr>
-          <a:lstStyle/>
-          <a:p>
-            <a:r>
-              <a:rPr lang="en-US" dirty="0"/>
-              <a:t>Continue with Mutation Testing</a:t>
-            </a:r>
-          </a:p>
-        </p:txBody>
-      </p:sp>
-      <p:sp>
-        <p:nvSpPr>
-          <p:cNvPr id="3" name="Subtitle 2"/>
-          <p:cNvSpPr>
-            <a:spLocks noGrp="1"/>
-          </p:cNvSpPr>
-          <p:nvPr>
-            <p:ph type="subTitle" idx="1"/>
+          <a:bodyPr/>
+          <a:lstStyle/>
+          <a:p>
+            <a:r>
+              <a:rPr lang="en-US" dirty="0"/>
+              <a:t>Comment the Include Recipe</a:t>
+            </a:r>
+          </a:p>
+        </p:txBody>
+      </p:sp>
+      <p:sp>
+        <p:nvSpPr>
+          <p:cNvPr id="3" name="Content Placeholder 2"/>
+          <p:cNvSpPr>
+            <a:spLocks noGrp="1"/>
+          </p:cNvSpPr>
+          <p:nvPr>
+            <p:ph sz="quarter" idx="10"/>
           </p:nvPr>
         </p:nvSpPr>
         <p:spPr/>
@@ -22675,113 +23287,130 @@
           <a:bodyPr/>
           <a:lstStyle/>
           <a:p>
-            <a:pPr>
-              <a:lnSpc>
-                <a:spcPct val="150000"/>
-              </a:lnSpc>
-              <a:buFont typeface="Wingdings" charset="2"/>
-              <a:buChar char="ü"/>
-            </a:pPr>
-            <a:r>
-              <a:rPr lang="en-US" dirty="0"/>
-              <a:t>Comment out the next line in the apache cookbook's default recipe</a:t>
-            </a:r>
-          </a:p>
-          <a:p>
-            <a:pPr>
-              <a:lnSpc>
-                <a:spcPct val="150000"/>
-              </a:lnSpc>
-              <a:buFont typeface="Wingdings" charset="2"/>
-              <a:buChar char="ü"/>
-            </a:pPr>
-            <a:r>
-              <a:rPr lang="en-US" dirty="0"/>
-              <a:t>Write the example with expectation that will generate a failure</a:t>
-            </a:r>
-          </a:p>
-          <a:p>
-            <a:pPr>
-              <a:lnSpc>
-                <a:spcPct val="150000"/>
-              </a:lnSpc>
-              <a:buFont typeface="Wingdings" charset="2"/>
-              <a:buChar char="ü"/>
-            </a:pPr>
-            <a:r>
-              <a:rPr lang="en-US" dirty="0"/>
-              <a:t>Verify that one example generates a failure</a:t>
-            </a:r>
-          </a:p>
-          <a:p>
-            <a:pPr>
-              <a:lnSpc>
-                <a:spcPct val="150000"/>
-              </a:lnSpc>
-              <a:buFont typeface="Wingdings" charset="2"/>
-              <a:buChar char="ü"/>
-            </a:pPr>
-            <a:r>
-              <a:rPr lang="en-US" dirty="0"/>
-              <a:t>Restore the code in the recipe</a:t>
-            </a:r>
-          </a:p>
-          <a:p>
-            <a:pPr>
-              <a:lnSpc>
-                <a:spcPct val="150000"/>
-              </a:lnSpc>
-              <a:buFont typeface="Wingdings" charset="2"/>
-              <a:buChar char="ü"/>
-            </a:pPr>
-            <a:r>
-              <a:rPr lang="en-US" dirty="0"/>
-              <a:t>Verify that all examples pass</a:t>
-            </a:r>
-          </a:p>
-        </p:txBody>
-      </p:sp>
-      <p:sp>
-        <p:nvSpPr>
-          <p:cNvPr id="4" name="TextBox 3"/>
-          <p:cNvSpPr txBox="1"/>
-          <p:nvPr/>
-        </p:nvSpPr>
-        <p:spPr bwMode="white">
+            <a:r>
+              <a:rPr lang="en-US" dirty="0"/>
+              <a:t>#</a:t>
+            </a:r>
+          </a:p>
+          <a:p>
+            <a:r>
+              <a:rPr lang="en-US" dirty="0"/>
+              <a:t># Cookbook Name:: apache</a:t>
+            </a:r>
+          </a:p>
+          <a:p>
+            <a:r>
+              <a:rPr lang="en-US" dirty="0"/>
+              <a:t># Recipe:: default</a:t>
+            </a:r>
+          </a:p>
+          <a:p>
+            <a:r>
+              <a:rPr lang="en-US" dirty="0"/>
+              <a:t>#</a:t>
+            </a:r>
+          </a:p>
+          <a:p>
+            <a:r>
+              <a:rPr lang="en-US" dirty="0"/>
+              <a:t># Copyright (c) </a:t>
+            </a:r>
+            <a:r>
+              <a:rPr lang="is-IS" dirty="0"/>
+              <a:t>2017</a:t>
+            </a:r>
+            <a:r>
+              <a:rPr lang="en-US" dirty="0"/>
+              <a:t> The Authors, All Rights Reserved.</a:t>
+            </a:r>
+          </a:p>
+          <a:p>
+            <a:r>
+              <a:rPr lang="en-US" dirty="0" err="1"/>
+              <a:t>include_recipe</a:t>
+            </a:r>
+            <a:r>
+              <a:rPr lang="en-US" dirty="0"/>
+              <a:t> 'apache::install'</a:t>
+            </a:r>
+          </a:p>
+          <a:p>
+            <a:r>
+              <a:rPr lang="en-US" dirty="0" err="1"/>
+              <a:t>include_recipe</a:t>
+            </a:r>
+            <a:r>
+              <a:rPr lang="en-US" dirty="0"/>
+              <a:t> 'apache::configuration'</a:t>
+            </a:r>
+          </a:p>
+          <a:p>
+            <a:r>
+              <a:rPr lang="en-US" dirty="0" err="1"/>
+              <a:t>include_recipe</a:t>
+            </a:r>
+            <a:r>
+              <a:rPr lang="en-US" dirty="0"/>
+              <a:t> 'apache::service'</a:t>
+            </a:r>
+          </a:p>
+        </p:txBody>
+      </p:sp>
+      <p:sp>
+        <p:nvSpPr>
+          <p:cNvPr id="4" name="Text Placeholder 3"/>
+          <p:cNvSpPr>
+            <a:spLocks noGrp="1"/>
+          </p:cNvSpPr>
+          <p:nvPr>
+            <p:ph type="body" sz="quarter" idx="11"/>
+          </p:nvPr>
+        </p:nvSpPr>
+        <p:spPr/>
+        <p:txBody>
+          <a:bodyPr/>
+          <a:lstStyle/>
+          <a:p>
+            <a:r>
+              <a:rPr lang="en-US" dirty="0"/>
+              <a:t>~/apache/recipes/</a:t>
+            </a:r>
+            <a:r>
+              <a:rPr lang="en-US" dirty="0" err="1"/>
+              <a:t>default.rb</a:t>
+            </a:r>
+            <a:endParaRPr lang="en-US" dirty="0"/>
+          </a:p>
+        </p:txBody>
+      </p:sp>
+      <p:sp>
+        <p:nvSpPr>
+          <p:cNvPr id="5" name="Text Placeholder 4"/>
+          <p:cNvSpPr>
+            <a:spLocks noGrp="1"/>
+          </p:cNvSpPr>
+          <p:nvPr>
+            <p:ph type="body" sz="quarter" idx="13"/>
+          </p:nvPr>
+        </p:nvSpPr>
+        <p:spPr>
           <a:xfrm>
-            <a:off x="1660524" y="7076661"/>
-            <a:ext cx="12330113" cy="675861"/>
+            <a:off x="1139359" y="5775108"/>
+            <a:ext cx="14404273" cy="622852"/>
           </a:xfrm>
-          <a:prstGeom prst="rect">
-            <a:avLst/>
-          </a:prstGeom>
-          <a:solidFill>
-            <a:schemeClr val="bg2">
-              <a:lumMod val="85000"/>
-            </a:schemeClr>
-          </a:solidFill>
         </p:spPr>
         <p:txBody>
-          <a:bodyPr vert="horz" wrap="square" lIns="91440" tIns="91440" rIns="91440" bIns="91440" rtlCol="0">
-            <a:normAutofit/>
-          </a:bodyPr>
-          <a:lstStyle/>
-          <a:p>
-            <a:pPr marL="342900" indent="-342900" algn="ctr">
-              <a:buFont typeface="Wingdings" charset="2"/>
-              <a:buChar char="v"/>
-            </a:pPr>
-            <a:r>
-              <a:rPr lang="en-US" b="1" dirty="0"/>
-              <a:t>Repeat this series of steps for each line within the default recipe</a:t>
-            </a:r>
+          <a:bodyPr/>
+          <a:lstStyle/>
+          <a:p>
+            <a:endParaRPr lang="en-US" dirty="0"/>
           </a:p>
         </p:txBody>
       </p:sp>
     </p:spTree>
     <p:extLst>
       <p:ext uri="{BB962C8B-B14F-4D97-AF65-F5344CB8AC3E}">
-        <p14:creationId xmlns:p14="http://schemas.microsoft.com/office/powerpoint/2010/main" val="833734926"/>
+        <p14:creationId xmlns:p14="http://schemas.microsoft.com/office/powerpoint/2010/main" val="679216510"/>
       </p:ext>
     </p:extLst>
   </p:cSld>
@@ -22818,7 +23447,7 @@
             <a:spLocks noGrp="1"/>
           </p:cNvSpPr>
           <p:nvPr>
-            <p:ph type="ctrTitle"/>
+            <p:ph type="title"/>
           </p:nvPr>
         </p:nvSpPr>
         <p:spPr/>
@@ -22830,85 +23459,213 @@
           <a:p>
             <a:r>
               <a:rPr lang="en-US" dirty="0"/>
-              <a:t>Discussion</a:t>
-            </a:r>
-          </a:p>
-        </p:txBody>
-      </p:sp>
-      <p:sp>
-        <p:nvSpPr>
-          <p:cNvPr id="3" name="Subtitle 2"/>
-          <p:cNvSpPr>
-            <a:spLocks noGrp="1"/>
-          </p:cNvSpPr>
-          <p:nvPr>
-            <p:ph type="subTitle" idx="1"/>
+              <a:t>Write the Test that Verifies the Include Recipe</a:t>
+            </a:r>
+          </a:p>
+        </p:txBody>
+      </p:sp>
+      <p:sp>
+        <p:nvSpPr>
+          <p:cNvPr id="3" name="Content Placeholder 2"/>
+          <p:cNvSpPr>
+            <a:spLocks noGrp="1"/>
+          </p:cNvSpPr>
+          <p:nvPr>
+            <p:ph sz="quarter" idx="10"/>
+          </p:nvPr>
+        </p:nvSpPr>
+        <p:spPr/>
+        <p:txBody>
+          <a:bodyPr>
+            <a:normAutofit fontScale="85000" lnSpcReduction="20000"/>
+          </a:bodyPr>
+          <a:lstStyle/>
+          <a:p>
+            <a:r>
+              <a:rPr lang="en-US" dirty="0"/>
+              <a:t> # ... START OF THE SPEC FILE ...</a:t>
+            </a:r>
+          </a:p>
+          <a:p>
+            <a:endParaRPr lang="en-US" dirty="0"/>
+          </a:p>
+          <a:p>
+            <a:r>
+              <a:rPr lang="en-US" dirty="0"/>
+              <a:t> it 'includes the install recipe' do</a:t>
+            </a:r>
+          </a:p>
+          <a:p>
+            <a:r>
+              <a:rPr lang="en-US" dirty="0"/>
+              <a:t>      expect(</a:t>
+            </a:r>
+            <a:r>
+              <a:rPr lang="en-US" dirty="0" err="1"/>
+              <a:t>chef_run</a:t>
+            </a:r>
+            <a:r>
+              <a:rPr lang="en-US" dirty="0"/>
+              <a:t>).to </a:t>
+            </a:r>
+            <a:r>
+              <a:rPr lang="en-US" dirty="0" err="1"/>
+              <a:t>include_recipe</a:t>
+            </a:r>
+            <a:r>
+              <a:rPr lang="en-US" dirty="0"/>
+              <a:t>('apache::install')</a:t>
+            </a:r>
+          </a:p>
+          <a:p>
+            <a:r>
+              <a:rPr lang="en-US" dirty="0"/>
+              <a:t>    end</a:t>
+            </a:r>
+          </a:p>
+          <a:p>
+            <a:endParaRPr lang="en-US" dirty="0"/>
+          </a:p>
+          <a:p>
+            <a:r>
+              <a:rPr lang="en-US" dirty="0"/>
+              <a:t>    it 'includes the configuration recipe' do</a:t>
+            </a:r>
+          </a:p>
+          <a:p>
+            <a:r>
+              <a:rPr lang="en-US" dirty="0"/>
+              <a:t>      expect(</a:t>
+            </a:r>
+            <a:r>
+              <a:rPr lang="en-US" dirty="0" err="1"/>
+              <a:t>chef_run</a:t>
+            </a:r>
+            <a:r>
+              <a:rPr lang="en-US" dirty="0"/>
+              <a:t>).to </a:t>
+            </a:r>
+            <a:r>
+              <a:rPr lang="en-US" dirty="0" err="1"/>
+              <a:t>include_recipe</a:t>
+            </a:r>
+            <a:r>
+              <a:rPr lang="en-US" dirty="0"/>
+              <a:t>('apache::configuration')</a:t>
+            </a:r>
+          </a:p>
+          <a:p>
+            <a:r>
+              <a:rPr lang="en-US" dirty="0"/>
+              <a:t>    end</a:t>
+            </a:r>
+          </a:p>
+          <a:p>
+            <a:endParaRPr lang="en-US" dirty="0"/>
+          </a:p>
+          <a:p>
+            <a:r>
+              <a:rPr lang="en-US" dirty="0"/>
+              <a:t>    it 'includes the service recipe' do</a:t>
+            </a:r>
+          </a:p>
+          <a:p>
+            <a:r>
+              <a:rPr lang="en-US" dirty="0"/>
+              <a:t>      expect(</a:t>
+            </a:r>
+            <a:r>
+              <a:rPr lang="en-US" dirty="0" err="1"/>
+              <a:t>chef_run</a:t>
+            </a:r>
+            <a:r>
+              <a:rPr lang="en-US" dirty="0"/>
+              <a:t>).to </a:t>
+            </a:r>
+            <a:r>
+              <a:rPr lang="en-US" dirty="0" err="1"/>
+              <a:t>include_recipe</a:t>
+            </a:r>
+            <a:r>
+              <a:rPr lang="en-US" dirty="0"/>
+              <a:t>('apache::service')</a:t>
+            </a:r>
+          </a:p>
+          <a:p>
+            <a:r>
+              <a:rPr lang="en-US" dirty="0"/>
+              <a:t>    end</a:t>
+            </a:r>
+          </a:p>
+          <a:p>
+            <a:r>
+              <a:rPr lang="en-US" dirty="0"/>
+              <a:t>  end</a:t>
+            </a:r>
+          </a:p>
+          <a:p>
+            <a:r>
+              <a:rPr lang="en-US" dirty="0"/>
+              <a:t>end</a:t>
+            </a:r>
+          </a:p>
+        </p:txBody>
+      </p:sp>
+      <p:sp>
+        <p:nvSpPr>
+          <p:cNvPr id="4" name="Text Placeholder 3"/>
+          <p:cNvSpPr>
+            <a:spLocks noGrp="1"/>
+          </p:cNvSpPr>
+          <p:nvPr>
+            <p:ph type="body" sz="quarter" idx="11"/>
+          </p:nvPr>
+        </p:nvSpPr>
+        <p:spPr/>
+        <p:txBody>
+          <a:bodyPr/>
+          <a:lstStyle/>
+          <a:p>
+            <a:r>
+              <a:rPr lang="en-US" dirty="0"/>
+              <a:t>~/apache/spec/unit/recipes/</a:t>
+            </a:r>
+            <a:r>
+              <a:rPr lang="en-US" dirty="0" err="1"/>
+              <a:t>default_spec.rb</a:t>
+            </a:r>
+            <a:endParaRPr lang="en-US" dirty="0"/>
+          </a:p>
+        </p:txBody>
+      </p:sp>
+      <p:sp>
+        <p:nvSpPr>
+          <p:cNvPr id="5" name="Text Placeholder 4"/>
+          <p:cNvSpPr>
+            <a:spLocks noGrp="1"/>
+          </p:cNvSpPr>
+          <p:nvPr>
+            <p:ph type="body" sz="quarter" idx="13"/>
           </p:nvPr>
         </p:nvSpPr>
         <p:spPr>
           <a:xfrm>
-            <a:off x="1660524" y="3260725"/>
-            <a:ext cx="12330113" cy="3427942"/>
+            <a:off x="1121104" y="5943599"/>
+            <a:ext cx="14404273" cy="1308179"/>
           </a:xfrm>
         </p:spPr>
         <p:txBody>
           <a:bodyPr/>
           <a:lstStyle/>
           <a:p>
-            <a:r>
-              <a:rPr lang="en-US" dirty="0"/>
-              <a:t>What functionality did you test in the integration tests?</a:t>
-            </a:r>
-          </a:p>
-          <a:p>
             <a:endParaRPr lang="en-US" dirty="0"/>
-          </a:p>
-          <a:p>
-            <a:r>
-              <a:rPr lang="en-US" dirty="0"/>
-              <a:t>What functionality did you test in these unit tests?</a:t>
-            </a:r>
-          </a:p>
-          <a:p>
-            <a:endParaRPr lang="en-US" dirty="0"/>
-          </a:p>
-          <a:p>
-            <a:r>
-              <a:rPr lang="en-US" dirty="0"/>
-              <a:t>What do you see as the scope of unit testing versus integration testing?</a:t>
-            </a:r>
-          </a:p>
-          <a:p>
-            <a:endParaRPr lang="en-US" dirty="0"/>
-          </a:p>
-          <a:p>
-            <a:r>
-              <a:rPr lang="en-US" dirty="0"/>
-              <a:t>What are the differences between a </a:t>
-            </a:r>
-            <a:r>
-              <a:rPr lang="en-US" dirty="0" err="1"/>
-              <a:t>ChefSpec</a:t>
-            </a:r>
-            <a:r>
-              <a:rPr lang="en-US" dirty="0"/>
-              <a:t> test and a </a:t>
-            </a:r>
-            <a:r>
-              <a:rPr lang="en-US" dirty="0" err="1"/>
-              <a:t>InSpec</a:t>
-            </a:r>
-            <a:r>
-              <a:rPr lang="en-US" dirty="0"/>
-              <a:t> test?</a:t>
-            </a:r>
           </a:p>
         </p:txBody>
       </p:sp>
     </p:spTree>
     <p:extLst>
       <p:ext uri="{BB962C8B-B14F-4D97-AF65-F5344CB8AC3E}">
-        <p14:creationId xmlns:p14="http://schemas.microsoft.com/office/powerpoint/2010/main" val="108599519"/>
+        <p14:creationId xmlns:p14="http://schemas.microsoft.com/office/powerpoint/2010/main" val="509882924"/>
       </p:ext>
     </p:extLst>
   </p:cSld>
@@ -22940,36 +23697,86 @@
       </p:grpSpPr>
       <p:sp>
         <p:nvSpPr>
-          <p:cNvPr id="2" name="Title 1"/>
-          <p:cNvSpPr>
-            <a:spLocks noGrp="1"/>
-          </p:cNvSpPr>
-          <p:nvPr>
-            <p:ph type="ctrTitle"/>
+          <p:cNvPr id="2" name="Content Placeholder 1"/>
+          <p:cNvSpPr>
+            <a:spLocks noGrp="1"/>
+          </p:cNvSpPr>
+          <p:nvPr>
+            <p:ph sz="quarter" idx="10"/>
           </p:nvPr>
         </p:nvSpPr>
         <p:spPr/>
         <p:txBody>
-          <a:bodyPr>
-            <a:normAutofit fontScale="90000"/>
-          </a:bodyPr>
-          <a:lstStyle/>
-          <a:p>
-            <a:r>
-              <a:rPr lang="en-US" dirty="0"/>
-              <a:t>Q&amp;A</a:t>
-            </a:r>
-          </a:p>
-        </p:txBody>
-      </p:sp>
-      <p:sp>
-        <p:nvSpPr>
-          <p:cNvPr id="3" name="Subtitle 2"/>
-          <p:cNvSpPr>
-            <a:spLocks noGrp="1"/>
-          </p:cNvSpPr>
-          <p:nvPr>
-            <p:ph type="subTitle" idx="1"/>
+          <a:bodyPr/>
+          <a:lstStyle/>
+          <a:p>
+            <a:r>
+              <a:rPr lang="en-US" dirty="0"/>
+              <a:t>...F</a:t>
+            </a:r>
+          </a:p>
+          <a:p>
+            <a:endParaRPr lang="en-US" dirty="0"/>
+          </a:p>
+          <a:p>
+            <a:r>
+              <a:rPr lang="en-US" dirty="0"/>
+              <a:t>Failures:</a:t>
+            </a:r>
+          </a:p>
+          <a:p>
+            <a:endParaRPr lang="en-US" dirty="0"/>
+          </a:p>
+          <a:p>
+            <a:r>
+              <a:rPr lang="en-US" dirty="0"/>
+              <a:t>  1) apache::default When all attributes are default, on an Centos 6.9 includes the service recipe</a:t>
+            </a:r>
+          </a:p>
+          <a:p>
+            <a:r>
+              <a:rPr lang="en-US" dirty="0"/>
+              <a:t>     Failure/Error: expect(</a:t>
+            </a:r>
+            <a:r>
+              <a:rPr lang="en-US" dirty="0" err="1"/>
+              <a:t>chef_run</a:t>
+            </a:r>
+            <a:r>
+              <a:rPr lang="en-US" dirty="0"/>
+              <a:t>).to </a:t>
+            </a:r>
+            <a:r>
+              <a:rPr lang="en-US" dirty="0" err="1"/>
+              <a:t>include_recipe</a:t>
+            </a:r>
+            <a:r>
+              <a:rPr lang="en-US" dirty="0"/>
+              <a:t>('apache::service')</a:t>
+            </a:r>
+          </a:p>
+          <a:p>
+            <a:r>
+              <a:rPr lang="en-US" dirty="0"/>
+              <a:t>       expected ["apache::default", "apache::install", "apache::configuration"] to include "apache::service"</a:t>
+            </a:r>
+          </a:p>
+          <a:p>
+            <a:r>
+              <a:rPr lang="en-US" dirty="0"/>
+              <a:t>     # ./spec/unit/recipes/default_spec.rb:31:in `block (3 levels) </a:t>
+            </a:r>
+          </a:p>
+        </p:txBody>
+      </p:sp>
+      <p:sp>
+        <p:nvSpPr>
+          <p:cNvPr id="3" name="Text Placeholder 2"/>
+          <p:cNvSpPr>
+            <a:spLocks noGrp="1"/>
+          </p:cNvSpPr>
+          <p:nvPr>
+            <p:ph type="body" sz="quarter" idx="11"/>
           </p:nvPr>
         </p:nvSpPr>
         <p:spPr/>
@@ -22979,7 +23786,66 @@
           <a:p>
             <a:r>
               <a:rPr lang="en-US" dirty="0"/>
-              <a:t>What questions can we answer for you?</a:t>
+              <a:t>&gt; chef exec </a:t>
+            </a:r>
+            <a:r>
+              <a:rPr lang="en-US" dirty="0" err="1"/>
+              <a:t>rspec</a:t>
+            </a:r>
+            <a:r>
+              <a:rPr lang="en-US" dirty="0"/>
+              <a:t> spec/unit/recipes/</a:t>
+            </a:r>
+            <a:r>
+              <a:rPr lang="en-US" dirty="0" err="1"/>
+              <a:t>default_spec.rb</a:t>
+            </a:r>
+            <a:endParaRPr lang="en-US" dirty="0"/>
+          </a:p>
+        </p:txBody>
+      </p:sp>
+      <p:sp>
+        <p:nvSpPr>
+          <p:cNvPr id="7" name="Content Placeholder 6"/>
+          <p:cNvSpPr>
+            <a:spLocks noGrp="1"/>
+          </p:cNvSpPr>
+          <p:nvPr>
+            <p:ph sz="quarter" idx="12"/>
+          </p:nvPr>
+        </p:nvSpPr>
+        <p:spPr>
+          <a:xfrm>
+            <a:off x="1127883" y="2315963"/>
+            <a:ext cx="14420850" cy="557213"/>
+          </a:xfrm>
+        </p:spPr>
+        <p:txBody>
+          <a:bodyPr/>
+          <a:lstStyle/>
+          <a:p>
+            <a:endParaRPr lang="en-US"/>
+          </a:p>
+        </p:txBody>
+      </p:sp>
+      <p:sp>
+        <p:nvSpPr>
+          <p:cNvPr id="5" name="Title 4"/>
+          <p:cNvSpPr>
+            <a:spLocks noGrp="1"/>
+          </p:cNvSpPr>
+          <p:nvPr>
+            <p:ph type="title"/>
+          </p:nvPr>
+        </p:nvSpPr>
+        <p:spPr/>
+        <p:txBody>
+          <a:bodyPr/>
+          <a:lstStyle/>
+          <a:p>
+            <a:r>
+              <a:rPr lang="en-US" dirty="0"/>
+              <a:t>Execute the Tests to See it Fail</a:t>
             </a:r>
           </a:p>
         </p:txBody>
@@ -22987,7 +23853,7 @@
     </p:spTree>
     <p:extLst>
       <p:ext uri="{BB962C8B-B14F-4D97-AF65-F5344CB8AC3E}">
-        <p14:creationId xmlns:p14="http://schemas.microsoft.com/office/powerpoint/2010/main" val="2421411435"/>
+        <p14:creationId xmlns:p14="http://schemas.microsoft.com/office/powerpoint/2010/main" val="2847470555"/>
       </p:ext>
     </p:extLst>
   </p:cSld>
@@ -23800,6 +24666,732 @@
       </p:grpSpPr>
       <p:sp>
         <p:nvSpPr>
+          <p:cNvPr id="2" name="Title 1"/>
+          <p:cNvSpPr>
+            <a:spLocks noGrp="1"/>
+          </p:cNvSpPr>
+          <p:nvPr>
+            <p:ph type="title"/>
+          </p:nvPr>
+        </p:nvSpPr>
+        <p:spPr/>
+        <p:txBody>
+          <a:bodyPr/>
+          <a:lstStyle/>
+          <a:p>
+            <a:r>
+              <a:rPr lang="en-US" dirty="0"/>
+              <a:t>Uncomment the Include Recipe</a:t>
+            </a:r>
+          </a:p>
+        </p:txBody>
+      </p:sp>
+      <p:sp>
+        <p:nvSpPr>
+          <p:cNvPr id="3" name="Content Placeholder 2"/>
+          <p:cNvSpPr>
+            <a:spLocks noGrp="1"/>
+          </p:cNvSpPr>
+          <p:nvPr>
+            <p:ph sz="quarter" idx="10"/>
+          </p:nvPr>
+        </p:nvSpPr>
+        <p:spPr/>
+        <p:txBody>
+          <a:bodyPr/>
+          <a:lstStyle/>
+          <a:p>
+            <a:r>
+              <a:rPr lang="en-US" dirty="0"/>
+              <a:t>#</a:t>
+            </a:r>
+          </a:p>
+          <a:p>
+            <a:r>
+              <a:rPr lang="en-US" dirty="0"/>
+              <a:t># Cookbook Name:: apache</a:t>
+            </a:r>
+          </a:p>
+          <a:p>
+            <a:r>
+              <a:rPr lang="en-US" dirty="0"/>
+              <a:t># Recipe:: default</a:t>
+            </a:r>
+          </a:p>
+          <a:p>
+            <a:r>
+              <a:rPr lang="en-US" dirty="0"/>
+              <a:t>#</a:t>
+            </a:r>
+          </a:p>
+          <a:p>
+            <a:r>
+              <a:rPr lang="en-US" dirty="0"/>
+              <a:t># Copyright (c) </a:t>
+            </a:r>
+            <a:r>
+              <a:rPr lang="is-IS" dirty="0"/>
+              <a:t>2017</a:t>
+            </a:r>
+            <a:r>
+              <a:rPr lang="en-US" dirty="0"/>
+              <a:t> The Authors, All Rights Reserved.</a:t>
+            </a:r>
+          </a:p>
+          <a:p>
+            <a:r>
+              <a:rPr lang="en-US" dirty="0" err="1"/>
+              <a:t>include_recipe</a:t>
+            </a:r>
+            <a:r>
+              <a:rPr lang="en-US" dirty="0"/>
+              <a:t> 'apache::install'</a:t>
+            </a:r>
+          </a:p>
+          <a:p>
+            <a:r>
+              <a:rPr lang="en-US" dirty="0" err="1"/>
+              <a:t>include_recipe</a:t>
+            </a:r>
+            <a:r>
+              <a:rPr lang="en-US" dirty="0"/>
+              <a:t> 'apache::configuration'</a:t>
+            </a:r>
+          </a:p>
+          <a:p>
+            <a:r>
+              <a:rPr lang="en-US" dirty="0" err="1"/>
+              <a:t>include_recipe</a:t>
+            </a:r>
+            <a:r>
+              <a:rPr lang="en-US" dirty="0"/>
+              <a:t> 'apache::service'</a:t>
+            </a:r>
+          </a:p>
+        </p:txBody>
+      </p:sp>
+      <p:sp>
+        <p:nvSpPr>
+          <p:cNvPr id="4" name="Text Placeholder 3"/>
+          <p:cNvSpPr>
+            <a:spLocks noGrp="1"/>
+          </p:cNvSpPr>
+          <p:nvPr>
+            <p:ph type="body" sz="quarter" idx="11"/>
+          </p:nvPr>
+        </p:nvSpPr>
+        <p:spPr/>
+        <p:txBody>
+          <a:bodyPr/>
+          <a:lstStyle/>
+          <a:p>
+            <a:r>
+              <a:rPr lang="en-US" dirty="0"/>
+              <a:t>~/apache/recipes/</a:t>
+            </a:r>
+            <a:r>
+              <a:rPr lang="en-US" dirty="0" err="1"/>
+              <a:t>default.rb</a:t>
+            </a:r>
+            <a:endParaRPr lang="en-US" dirty="0"/>
+          </a:p>
+        </p:txBody>
+      </p:sp>
+      <p:sp>
+        <p:nvSpPr>
+          <p:cNvPr id="5" name="Text Placeholder 4"/>
+          <p:cNvSpPr>
+            <a:spLocks noGrp="1"/>
+          </p:cNvSpPr>
+          <p:nvPr>
+            <p:ph type="body" sz="quarter" idx="13"/>
+          </p:nvPr>
+        </p:nvSpPr>
+        <p:spPr>
+          <a:xfrm>
+            <a:off x="1139359" y="5753336"/>
+            <a:ext cx="14404273" cy="622852"/>
+          </a:xfrm>
+        </p:spPr>
+        <p:txBody>
+          <a:bodyPr/>
+          <a:lstStyle/>
+          <a:p>
+            <a:endParaRPr lang="en-US" dirty="0"/>
+          </a:p>
+        </p:txBody>
+      </p:sp>
+    </p:spTree>
+    <p:extLst>
+      <p:ext uri="{BB962C8B-B14F-4D97-AF65-F5344CB8AC3E}">
+        <p14:creationId xmlns:p14="http://schemas.microsoft.com/office/powerpoint/2010/main" val="2560950158"/>
+      </p:ext>
+    </p:extLst>
+  </p:cSld>
+  <p:clrMapOvr>
+    <a:masterClrMapping/>
+  </p:clrMapOvr>
+  <p:transition spd="med">
+    <p:fade/>
+  </p:transition>
+</p:sld>
+</file>
+
+<file path=ppt/slides/slide41.xml><?xml version="1.0" encoding="utf-8"?>
+<p:sld xmlns:a="http://schemas.openxmlformats.org/drawingml/2006/main" xmlns:r="http://schemas.openxmlformats.org/officeDocument/2006/relationships" xmlns:p="http://schemas.openxmlformats.org/presentationml/2006/main">
+  <p:cSld>
+    <p:spTree>
+      <p:nvGrpSpPr>
+        <p:cNvPr id="1" name=""/>
+        <p:cNvGrpSpPr/>
+        <p:nvPr/>
+      </p:nvGrpSpPr>
+      <p:grpSpPr>
+        <a:xfrm>
+          <a:off x="0" y="0"/>
+          <a:ext cx="0" cy="0"/>
+          <a:chOff x="0" y="0"/>
+          <a:chExt cx="0" cy="0"/>
+        </a:xfrm>
+      </p:grpSpPr>
+      <p:sp>
+        <p:nvSpPr>
+          <p:cNvPr id="2" name="Content Placeholder 1"/>
+          <p:cNvSpPr>
+            <a:spLocks noGrp="1"/>
+          </p:cNvSpPr>
+          <p:nvPr>
+            <p:ph sz="quarter" idx="10"/>
+          </p:nvPr>
+        </p:nvSpPr>
+        <p:spPr/>
+        <p:txBody>
+          <a:bodyPr/>
+          <a:lstStyle/>
+          <a:p>
+            <a:r>
+              <a:rPr lang="en-US" dirty="0"/>
+              <a:t>....</a:t>
+            </a:r>
+          </a:p>
+          <a:p>
+            <a:endParaRPr lang="en-US" dirty="0"/>
+          </a:p>
+          <a:p>
+            <a:r>
+              <a:rPr lang="en-US" dirty="0"/>
+              <a:t>Finished in 1.38 seconds (files took 4.16 seconds to load)</a:t>
+            </a:r>
+          </a:p>
+          <a:p>
+            <a:r>
+              <a:rPr lang="en-US" dirty="0"/>
+              <a:t>4 examples, 0 failures</a:t>
+            </a:r>
+          </a:p>
+        </p:txBody>
+      </p:sp>
+      <p:sp>
+        <p:nvSpPr>
+          <p:cNvPr id="3" name="Text Placeholder 2"/>
+          <p:cNvSpPr>
+            <a:spLocks noGrp="1"/>
+          </p:cNvSpPr>
+          <p:nvPr>
+            <p:ph type="body" sz="quarter" idx="11"/>
+          </p:nvPr>
+        </p:nvSpPr>
+        <p:spPr/>
+        <p:txBody>
+          <a:bodyPr/>
+          <a:lstStyle/>
+          <a:p>
+            <a:r>
+              <a:rPr lang="en-US" dirty="0"/>
+              <a:t>&gt; chef exec </a:t>
+            </a:r>
+            <a:r>
+              <a:rPr lang="en-US" dirty="0" err="1"/>
+              <a:t>rspec</a:t>
+            </a:r>
+            <a:r>
+              <a:rPr lang="en-US" dirty="0"/>
+              <a:t> spec/unit/recipes/</a:t>
+            </a:r>
+            <a:r>
+              <a:rPr lang="en-US" dirty="0" err="1"/>
+              <a:t>default_spec.rb</a:t>
+            </a:r>
+            <a:endParaRPr lang="en-US" dirty="0"/>
+          </a:p>
+        </p:txBody>
+      </p:sp>
+      <p:sp>
+        <p:nvSpPr>
+          <p:cNvPr id="6" name="Content Placeholder 5"/>
+          <p:cNvSpPr>
+            <a:spLocks noGrp="1"/>
+          </p:cNvSpPr>
+          <p:nvPr>
+            <p:ph sz="quarter" idx="12"/>
+          </p:nvPr>
+        </p:nvSpPr>
+        <p:spPr>
+          <a:xfrm>
+            <a:off x="1127883" y="2315963"/>
+            <a:ext cx="14420850" cy="557213"/>
+          </a:xfrm>
+        </p:spPr>
+        <p:txBody>
+          <a:bodyPr/>
+          <a:lstStyle/>
+          <a:p>
+            <a:endParaRPr lang="en-US"/>
+          </a:p>
+        </p:txBody>
+      </p:sp>
+      <p:sp>
+        <p:nvSpPr>
+          <p:cNvPr id="5" name="Title 4"/>
+          <p:cNvSpPr>
+            <a:spLocks noGrp="1"/>
+          </p:cNvSpPr>
+          <p:nvPr>
+            <p:ph type="title"/>
+          </p:nvPr>
+        </p:nvSpPr>
+        <p:spPr/>
+        <p:txBody>
+          <a:bodyPr/>
+          <a:lstStyle/>
+          <a:p>
+            <a:r>
+              <a:rPr lang="en-US" dirty="0"/>
+              <a:t>Execute the Tests to </a:t>
+            </a:r>
+            <a:r>
+              <a:rPr lang="en-US"/>
+              <a:t>See it Pass</a:t>
+            </a:r>
+          </a:p>
+        </p:txBody>
+      </p:sp>
+    </p:spTree>
+    <p:extLst>
+      <p:ext uri="{BB962C8B-B14F-4D97-AF65-F5344CB8AC3E}">
+        <p14:creationId xmlns:p14="http://schemas.microsoft.com/office/powerpoint/2010/main" val="1817179830"/>
+      </p:ext>
+    </p:extLst>
+  </p:cSld>
+  <p:clrMapOvr>
+    <a:masterClrMapping/>
+  </p:clrMapOvr>
+  <p:transition spd="med">
+    <p:fade/>
+  </p:transition>
+</p:sld>
+</file>
+
+<file path=ppt/slides/slide42.xml><?xml version="1.0" encoding="utf-8"?>
+<p:sld xmlns:a="http://schemas.openxmlformats.org/drawingml/2006/main" xmlns:r="http://schemas.openxmlformats.org/officeDocument/2006/relationships" xmlns:p="http://schemas.openxmlformats.org/presentationml/2006/main">
+  <p:cSld>
+    <p:spTree>
+      <p:nvGrpSpPr>
+        <p:cNvPr id="1" name=""/>
+        <p:cNvGrpSpPr/>
+        <p:nvPr/>
+      </p:nvGrpSpPr>
+      <p:grpSpPr>
+        <a:xfrm>
+          <a:off x="0" y="0"/>
+          <a:ext cx="0" cy="0"/>
+          <a:chOff x="0" y="0"/>
+          <a:chExt cx="0" cy="0"/>
+        </a:xfrm>
+      </p:grpSpPr>
+      <p:sp>
+        <p:nvSpPr>
+          <p:cNvPr id="2" name="Title 1"/>
+          <p:cNvSpPr>
+            <a:spLocks noGrp="1"/>
+          </p:cNvSpPr>
+          <p:nvPr>
+            <p:ph type="ctrTitle"/>
+          </p:nvPr>
+        </p:nvSpPr>
+        <p:spPr/>
+        <p:txBody>
+          <a:bodyPr>
+            <a:normAutofit fontScale="90000"/>
+          </a:bodyPr>
+          <a:lstStyle/>
+          <a:p>
+            <a:r>
+              <a:rPr lang="en-US" dirty="0"/>
+              <a:t>Continue with Mutation Testing</a:t>
+            </a:r>
+          </a:p>
+        </p:txBody>
+      </p:sp>
+      <p:sp>
+        <p:nvSpPr>
+          <p:cNvPr id="3" name="Subtitle 2"/>
+          <p:cNvSpPr>
+            <a:spLocks noGrp="1"/>
+          </p:cNvSpPr>
+          <p:nvPr>
+            <p:ph type="subTitle" idx="1"/>
+          </p:nvPr>
+        </p:nvSpPr>
+        <p:spPr/>
+        <p:txBody>
+          <a:bodyPr/>
+          <a:lstStyle/>
+          <a:p>
+            <a:pPr>
+              <a:lnSpc>
+                <a:spcPct val="150000"/>
+              </a:lnSpc>
+              <a:buFont typeface="Wingdings" charset="2"/>
+              <a:buChar char="ü"/>
+            </a:pPr>
+            <a:r>
+              <a:rPr lang="en-US" dirty="0"/>
+              <a:t>Comment out the next line in the apache cookbook's default recipe</a:t>
+            </a:r>
+          </a:p>
+          <a:p>
+            <a:pPr>
+              <a:lnSpc>
+                <a:spcPct val="150000"/>
+              </a:lnSpc>
+              <a:buFont typeface="Wingdings" charset="2"/>
+              <a:buChar char="ü"/>
+            </a:pPr>
+            <a:r>
+              <a:rPr lang="en-US" dirty="0"/>
+              <a:t>Write the example with expectation that will generate a failure</a:t>
+            </a:r>
+          </a:p>
+          <a:p>
+            <a:pPr>
+              <a:lnSpc>
+                <a:spcPct val="150000"/>
+              </a:lnSpc>
+              <a:buFont typeface="Wingdings" charset="2"/>
+              <a:buChar char="ü"/>
+            </a:pPr>
+            <a:r>
+              <a:rPr lang="en-US" dirty="0"/>
+              <a:t>Verify that one example generates a failure</a:t>
+            </a:r>
+          </a:p>
+          <a:p>
+            <a:pPr>
+              <a:lnSpc>
+                <a:spcPct val="150000"/>
+              </a:lnSpc>
+              <a:buFont typeface="Wingdings" charset="2"/>
+              <a:buChar char="ü"/>
+            </a:pPr>
+            <a:r>
+              <a:rPr lang="en-US" dirty="0"/>
+              <a:t>Restore the code in the recipe</a:t>
+            </a:r>
+          </a:p>
+          <a:p>
+            <a:pPr>
+              <a:lnSpc>
+                <a:spcPct val="150000"/>
+              </a:lnSpc>
+              <a:buFont typeface="Wingdings" charset="2"/>
+              <a:buChar char="ü"/>
+            </a:pPr>
+            <a:r>
+              <a:rPr lang="en-US" dirty="0"/>
+              <a:t>Verify that all examples pass</a:t>
+            </a:r>
+          </a:p>
+        </p:txBody>
+      </p:sp>
+      <p:sp>
+        <p:nvSpPr>
+          <p:cNvPr id="4" name="TextBox 3"/>
+          <p:cNvSpPr txBox="1"/>
+          <p:nvPr/>
+        </p:nvSpPr>
+        <p:spPr bwMode="white">
+          <a:xfrm>
+            <a:off x="1660524" y="7076661"/>
+            <a:ext cx="12330113" cy="675861"/>
+          </a:xfrm>
+          <a:prstGeom prst="rect">
+            <a:avLst/>
+          </a:prstGeom>
+          <a:solidFill>
+            <a:schemeClr val="bg2">
+              <a:lumMod val="85000"/>
+            </a:schemeClr>
+          </a:solidFill>
+        </p:spPr>
+        <p:txBody>
+          <a:bodyPr vert="horz" wrap="square" lIns="91440" tIns="91440" rIns="91440" bIns="91440" rtlCol="0">
+            <a:normAutofit/>
+          </a:bodyPr>
+          <a:lstStyle/>
+          <a:p>
+            <a:pPr marL="342900" indent="-342900" algn="ctr">
+              <a:buFont typeface="Wingdings" charset="2"/>
+              <a:buChar char="v"/>
+            </a:pPr>
+            <a:r>
+              <a:rPr lang="en-US" b="1" dirty="0"/>
+              <a:t>Repeat this series of steps for each line within the default recipe</a:t>
+            </a:r>
+          </a:p>
+        </p:txBody>
+      </p:sp>
+    </p:spTree>
+    <p:extLst>
+      <p:ext uri="{BB962C8B-B14F-4D97-AF65-F5344CB8AC3E}">
+        <p14:creationId xmlns:p14="http://schemas.microsoft.com/office/powerpoint/2010/main" val="833734926"/>
+      </p:ext>
+    </p:extLst>
+  </p:cSld>
+  <p:clrMapOvr>
+    <a:masterClrMapping/>
+  </p:clrMapOvr>
+  <p:transition spd="med">
+    <p:fade/>
+  </p:transition>
+</p:sld>
+</file>
+
+<file path=ppt/slides/slide43.xml><?xml version="1.0" encoding="utf-8"?>
+<p:sld xmlns:a="http://schemas.openxmlformats.org/drawingml/2006/main" xmlns:r="http://schemas.openxmlformats.org/officeDocument/2006/relationships" xmlns:p="http://schemas.openxmlformats.org/presentationml/2006/main">
+  <p:cSld>
+    <p:spTree>
+      <p:nvGrpSpPr>
+        <p:cNvPr id="1" name=""/>
+        <p:cNvGrpSpPr/>
+        <p:nvPr/>
+      </p:nvGrpSpPr>
+      <p:grpSpPr>
+        <a:xfrm>
+          <a:off x="0" y="0"/>
+          <a:ext cx="0" cy="0"/>
+          <a:chOff x="0" y="0"/>
+          <a:chExt cx="0" cy="0"/>
+        </a:xfrm>
+      </p:grpSpPr>
+      <p:sp>
+        <p:nvSpPr>
+          <p:cNvPr id="2" name="Title 1"/>
+          <p:cNvSpPr>
+            <a:spLocks noGrp="1"/>
+          </p:cNvSpPr>
+          <p:nvPr>
+            <p:ph type="ctrTitle"/>
+          </p:nvPr>
+        </p:nvSpPr>
+        <p:spPr/>
+        <p:txBody>
+          <a:bodyPr>
+            <a:normAutofit fontScale="90000"/>
+          </a:bodyPr>
+          <a:lstStyle/>
+          <a:p>
+            <a:r>
+              <a:rPr lang="en-US" dirty="0"/>
+              <a:t>Discussion</a:t>
+            </a:r>
+          </a:p>
+        </p:txBody>
+      </p:sp>
+      <p:sp>
+        <p:nvSpPr>
+          <p:cNvPr id="3" name="Subtitle 2"/>
+          <p:cNvSpPr>
+            <a:spLocks noGrp="1"/>
+          </p:cNvSpPr>
+          <p:nvPr>
+            <p:ph type="subTitle" idx="1"/>
+          </p:nvPr>
+        </p:nvSpPr>
+        <p:spPr>
+          <a:xfrm>
+            <a:off x="1660524" y="3260725"/>
+            <a:ext cx="12330113" cy="3427942"/>
+          </a:xfrm>
+        </p:spPr>
+        <p:txBody>
+          <a:bodyPr/>
+          <a:lstStyle/>
+          <a:p>
+            <a:r>
+              <a:rPr lang="en-US" dirty="0"/>
+              <a:t>What functionality did you test in the integration tests?</a:t>
+            </a:r>
+          </a:p>
+          <a:p>
+            <a:endParaRPr lang="en-US" dirty="0"/>
+          </a:p>
+          <a:p>
+            <a:r>
+              <a:rPr lang="en-US" dirty="0"/>
+              <a:t>What functionality did you test in these unit tests?</a:t>
+            </a:r>
+          </a:p>
+          <a:p>
+            <a:endParaRPr lang="en-US" dirty="0"/>
+          </a:p>
+          <a:p>
+            <a:r>
+              <a:rPr lang="en-US" dirty="0"/>
+              <a:t>What do you see as the scope of unit testing versus integration testing?</a:t>
+            </a:r>
+          </a:p>
+          <a:p>
+            <a:endParaRPr lang="en-US" dirty="0"/>
+          </a:p>
+          <a:p>
+            <a:r>
+              <a:rPr lang="en-US" dirty="0"/>
+              <a:t>What are the differences between a </a:t>
+            </a:r>
+            <a:r>
+              <a:rPr lang="en-US" dirty="0" err="1"/>
+              <a:t>ChefSpec</a:t>
+            </a:r>
+            <a:r>
+              <a:rPr lang="en-US" dirty="0"/>
+              <a:t> test and a </a:t>
+            </a:r>
+            <a:r>
+              <a:rPr lang="en-US" dirty="0" err="1"/>
+              <a:t>InSpec</a:t>
+            </a:r>
+            <a:r>
+              <a:rPr lang="en-US" dirty="0"/>
+              <a:t> test?</a:t>
+            </a:r>
+          </a:p>
+        </p:txBody>
+      </p:sp>
+    </p:spTree>
+    <p:extLst>
+      <p:ext uri="{BB962C8B-B14F-4D97-AF65-F5344CB8AC3E}">
+        <p14:creationId xmlns:p14="http://schemas.microsoft.com/office/powerpoint/2010/main" val="108599519"/>
+      </p:ext>
+    </p:extLst>
+  </p:cSld>
+  <p:clrMapOvr>
+    <a:masterClrMapping/>
+  </p:clrMapOvr>
+  <p:transition spd="med">
+    <p:fade/>
+  </p:transition>
+</p:sld>
+</file>
+
+<file path=ppt/slides/slide44.xml><?xml version="1.0" encoding="utf-8"?>
+<p:sld xmlns:a="http://schemas.openxmlformats.org/drawingml/2006/main" xmlns:r="http://schemas.openxmlformats.org/officeDocument/2006/relationships" xmlns:p="http://schemas.openxmlformats.org/presentationml/2006/main">
+  <p:cSld>
+    <p:spTree>
+      <p:nvGrpSpPr>
+        <p:cNvPr id="1" name=""/>
+        <p:cNvGrpSpPr/>
+        <p:nvPr/>
+      </p:nvGrpSpPr>
+      <p:grpSpPr>
+        <a:xfrm>
+          <a:off x="0" y="0"/>
+          <a:ext cx="0" cy="0"/>
+          <a:chOff x="0" y="0"/>
+          <a:chExt cx="0" cy="0"/>
+        </a:xfrm>
+      </p:grpSpPr>
+      <p:sp>
+        <p:nvSpPr>
+          <p:cNvPr id="2" name="Title 1"/>
+          <p:cNvSpPr>
+            <a:spLocks noGrp="1"/>
+          </p:cNvSpPr>
+          <p:nvPr>
+            <p:ph type="ctrTitle"/>
+          </p:nvPr>
+        </p:nvSpPr>
+        <p:spPr/>
+        <p:txBody>
+          <a:bodyPr>
+            <a:normAutofit fontScale="90000"/>
+          </a:bodyPr>
+          <a:lstStyle/>
+          <a:p>
+            <a:r>
+              <a:rPr lang="en-US" dirty="0"/>
+              <a:t>Q&amp;A</a:t>
+            </a:r>
+          </a:p>
+        </p:txBody>
+      </p:sp>
+      <p:sp>
+        <p:nvSpPr>
+          <p:cNvPr id="3" name="Subtitle 2"/>
+          <p:cNvSpPr>
+            <a:spLocks noGrp="1"/>
+          </p:cNvSpPr>
+          <p:nvPr>
+            <p:ph type="subTitle" idx="1"/>
+          </p:nvPr>
+        </p:nvSpPr>
+        <p:spPr/>
+        <p:txBody>
+          <a:bodyPr/>
+          <a:lstStyle/>
+          <a:p>
+            <a:r>
+              <a:rPr lang="en-US" dirty="0"/>
+              <a:t>What questions can we answer for you?</a:t>
+            </a:r>
+          </a:p>
+        </p:txBody>
+      </p:sp>
+    </p:spTree>
+    <p:extLst>
+      <p:ext uri="{BB962C8B-B14F-4D97-AF65-F5344CB8AC3E}">
+        <p14:creationId xmlns:p14="http://schemas.microsoft.com/office/powerpoint/2010/main" val="2421411435"/>
+      </p:ext>
+    </p:extLst>
+  </p:cSld>
+  <p:clrMapOvr>
+    <a:masterClrMapping/>
+  </p:clrMapOvr>
+  <p:transition spd="med">
+    <p:fade/>
+  </p:transition>
+</p:sld>
+</file>
+
+<file path=ppt/slides/slide45.xml><?xml version="1.0" encoding="utf-8"?>
+<p:sld xmlns:a="http://schemas.openxmlformats.org/drawingml/2006/main" xmlns:r="http://schemas.openxmlformats.org/officeDocument/2006/relationships" xmlns:p="http://schemas.openxmlformats.org/presentationml/2006/main">
+  <p:cSld>
+    <p:spTree>
+      <p:nvGrpSpPr>
+        <p:cNvPr id="1" name=""/>
+        <p:cNvGrpSpPr/>
+        <p:nvPr/>
+      </p:nvGrpSpPr>
+      <p:grpSpPr>
+        <a:xfrm>
+          <a:off x="0" y="0"/>
+          <a:ext cx="0" cy="0"/>
+          <a:chOff x="0" y="0"/>
+          <a:chExt cx="0" cy="0"/>
+        </a:xfrm>
+      </p:grpSpPr>
+      <p:sp>
+        <p:nvSpPr>
           <p:cNvPr id="2" name="Content Placeholder 1"/>
           <p:cNvSpPr>
             <a:spLocks noGrp="1"/>
@@ -23943,7 +25535,7 @@
 </p:sld>
 </file>
 
-<file path=ppt/slides/slide41.xml><?xml version="1.0" encoding="utf-8"?>
+<file path=ppt/slides/slide46.xml><?xml version="1.0" encoding="utf-8"?>
 <p:sld xmlns:a="http://schemas.openxmlformats.org/drawingml/2006/main" xmlns:r="http://schemas.openxmlformats.org/officeDocument/2006/relationships" xmlns:p="http://schemas.openxmlformats.org/presentationml/2006/main">
   <p:cSld>
     <p:spTree>
@@ -29790,6 +31382,18 @@
 </file>
 
 <file path=customXml/item1.xml><?xml version="1.0" encoding="utf-8"?>
+<p:properties xmlns:p="http://schemas.microsoft.com/office/2006/metadata/properties" xmlns:xsi="http://www.w3.org/2001/XMLSchema-instance" xmlns:pc="http://schemas.microsoft.com/office/infopath/2007/PartnerControls">
+  <documentManagement>
+    <_dlc_DocId xmlns="7bb5d761-a2ea-4873-95f7-7a6658fb3ef0">M4CWTKMW727E-592-73</_dlc_DocId>
+    <_dlc_DocIdUrl xmlns="7bb5d761-a2ea-4873-95f7-7a6658fb3ef0">
+      <Url>https://kms.vci.local/marketing/team/_layouts/DocIdRedir.aspx?ID=M4CWTKMW727E-592-73</Url>
+      <Description>M4CWTKMW727E-592-73</Description>
+    </_dlc_DocIdUrl>
+  </documentManagement>
+</p:properties>
+</file>
+
+<file path=customXml/item2.xml><?xml version="1.0" encoding="utf-8"?>
 <ct:contentTypeSchema xmlns:ct="http://schemas.microsoft.com/office/2006/metadata/contentType" xmlns:ma="http://schemas.microsoft.com/office/2006/metadata/properties/metaAttributes" ct:_="" ma:_="" ma:contentTypeName="Document" ma:contentTypeID="0x0101000812F700BE7F874999720E88173FE491" ma:contentTypeVersion="0" ma:contentTypeDescription="Create a new document." ma:contentTypeScope="" ma:versionID="3f79f408e2ca720b7aba6e0e32464d0c">
   <xsd:schema xmlns:xsd="http://www.w3.org/2001/XMLSchema" xmlns:xs="http://www.w3.org/2001/XMLSchema" xmlns:p="http://schemas.microsoft.com/office/2006/metadata/properties" xmlns:ns2="7bb5d761-a2ea-4873-95f7-7a6658fb3ef0" targetNamespace="http://schemas.microsoft.com/office/2006/metadata/properties" ma:root="true" ma:fieldsID="1e062cd38ba31e406bfc4340fbc7f87a" ns2:_="">
     <xsd:import namespace="7bb5d761-a2ea-4873-95f7-7a6658fb3ef0"/>
@@ -29934,28 +31538,7 @@
 </ct:contentTypeSchema>
 </file>
 
-<file path=customXml/item2.xml><?xml version="1.0" encoding="utf-8"?>
-<p:properties xmlns:p="http://schemas.microsoft.com/office/2006/metadata/properties" xmlns:xsi="http://www.w3.org/2001/XMLSchema-instance" xmlns:pc="http://schemas.microsoft.com/office/infopath/2007/PartnerControls">
-  <documentManagement>
-    <_dlc_DocId xmlns="7bb5d761-a2ea-4873-95f7-7a6658fb3ef0">M4CWTKMW727E-592-73</_dlc_DocId>
-    <_dlc_DocIdUrl xmlns="7bb5d761-a2ea-4873-95f7-7a6658fb3ef0">
-      <Url>https://kms.vci.local/marketing/team/_layouts/DocIdRedir.aspx?ID=M4CWTKMW727E-592-73</Url>
-      <Description>M4CWTKMW727E-592-73</Description>
-    </_dlc_DocIdUrl>
-  </documentManagement>
-</p:properties>
-</file>
-
 <file path=customXml/item3.xml><?xml version="1.0" encoding="utf-8"?>
-<?mso-contentType ?>
-<FormTemplates xmlns="http://schemas.microsoft.com/sharepoint/v3/contenttype/forms">
-  <Display>DocumentLibraryForm</Display>
-  <Edit>DocumentLibraryForm</Edit>
-  <New>DocumentLibraryForm</New>
-</FormTemplates>
-</file>
-
-<file path=customXml/item4.xml><?xml version="1.0" encoding="utf-8"?>
 <?mso-contentType ?>
 <spe:Receivers xmlns:spe="http://schemas.microsoft.com/sharepoint/events">
   <Receiver>
@@ -30001,7 +31584,32 @@
 </spe:Receivers>
 </file>
 
+<file path=customXml/item4.xml><?xml version="1.0" encoding="utf-8"?>
+<?mso-contentType ?>
+<FormTemplates xmlns="http://schemas.microsoft.com/sharepoint/v3/contenttype/forms">
+  <Display>DocumentLibraryForm</Display>
+  <Edit>DocumentLibraryForm</Edit>
+  <New>DocumentLibraryForm</New>
+</FormTemplates>
+</file>
+
 <file path=customXml/itemProps1.xml><?xml version="1.0" encoding="utf-8"?>
+<ds:datastoreItem xmlns:ds="http://schemas.openxmlformats.org/officeDocument/2006/customXml" ds:itemID="{6921749B-AEB7-461B-845F-603CABD25259}">
+  <ds:schemaRefs>
+    <ds:schemaRef ds:uri="7bb5d761-a2ea-4873-95f7-7a6658fb3ef0"/>
+    <ds:schemaRef ds:uri="http://purl.org/dc/terms/"/>
+    <ds:schemaRef ds:uri="http://schemas.openxmlformats.org/package/2006/metadata/core-properties"/>
+    <ds:schemaRef ds:uri="http://purl.org/dc/dcmitype/"/>
+    <ds:schemaRef ds:uri="http://schemas.microsoft.com/office/2006/documentManagement/types"/>
+    <ds:schemaRef ds:uri="http://purl.org/dc/elements/1.1/"/>
+    <ds:schemaRef ds:uri="http://schemas.microsoft.com/office/2006/metadata/properties"/>
+    <ds:schemaRef ds:uri="http://schemas.microsoft.com/office/infopath/2007/PartnerControls"/>
+    <ds:schemaRef ds:uri="http://www.w3.org/XML/1998/namespace"/>
+  </ds:schemaRefs>
+</ds:datastoreItem>
+</file>
+
+<file path=customXml/itemProps2.xml><?xml version="1.0" encoding="utf-8"?>
 <ds:datastoreItem xmlns:ds="http://schemas.openxmlformats.org/officeDocument/2006/customXml" ds:itemID="{164479E5-0B02-49AC-B79E-EC1D6164DDD3}">
   <ds:schemaRefs>
     <ds:schemaRef ds:uri="http://schemas.microsoft.com/office/2006/metadata/contentType"/>
@@ -30019,34 +31627,18 @@
 </ds:datastoreItem>
 </file>
 
-<file path=customXml/itemProps2.xml><?xml version="1.0" encoding="utf-8"?>
-<ds:datastoreItem xmlns:ds="http://schemas.openxmlformats.org/officeDocument/2006/customXml" ds:itemID="{6921749B-AEB7-461B-845F-603CABD25259}">
+<file path=customXml/itemProps3.xml><?xml version="1.0" encoding="utf-8"?>
+<ds:datastoreItem xmlns:ds="http://schemas.openxmlformats.org/officeDocument/2006/customXml" ds:itemID="{B13EBC30-FE27-4C6A-B723-23FC2188F7DC}">
   <ds:schemaRefs>
-    <ds:schemaRef ds:uri="7bb5d761-a2ea-4873-95f7-7a6658fb3ef0"/>
-    <ds:schemaRef ds:uri="http://purl.org/dc/terms/"/>
-    <ds:schemaRef ds:uri="http://schemas.openxmlformats.org/package/2006/metadata/core-properties"/>
-    <ds:schemaRef ds:uri="http://purl.org/dc/dcmitype/"/>
-    <ds:schemaRef ds:uri="http://schemas.microsoft.com/office/2006/documentManagement/types"/>
-    <ds:schemaRef ds:uri="http://purl.org/dc/elements/1.1/"/>
-    <ds:schemaRef ds:uri="http://schemas.microsoft.com/office/2006/metadata/properties"/>
-    <ds:schemaRef ds:uri="http://schemas.microsoft.com/office/infopath/2007/PartnerControls"/>
-    <ds:schemaRef ds:uri="http://www.w3.org/XML/1998/namespace"/>
+    <ds:schemaRef ds:uri="http://schemas.microsoft.com/sharepoint/events"/>
   </ds:schemaRefs>
 </ds:datastoreItem>
 </file>
 
-<file path=customXml/itemProps3.xml><?xml version="1.0" encoding="utf-8"?>
+<file path=customXml/itemProps4.xml><?xml version="1.0" encoding="utf-8"?>
 <ds:datastoreItem xmlns:ds="http://schemas.openxmlformats.org/officeDocument/2006/customXml" ds:itemID="{5CDEB364-43EC-4510-9881-539C2A3FCE9E}">
   <ds:schemaRefs>
     <ds:schemaRef ds:uri="http://schemas.microsoft.com/sharepoint/v3/contenttype/forms"/>
   </ds:schemaRefs>
 </ds:datastoreItem>
-</file>
-
-<file path=customXml/itemProps4.xml><?xml version="1.0" encoding="utf-8"?>
-<ds:datastoreItem xmlns:ds="http://schemas.openxmlformats.org/officeDocument/2006/customXml" ds:itemID="{B13EBC30-FE27-4C6A-B723-23FC2188F7DC}">
-  <ds:schemaRefs>
-    <ds:schemaRef ds:uri="http://schemas.microsoft.com/sharepoint/events"/>
-  </ds:schemaRefs>
-</ds:datastoreItem>
 </file>
</xml_diff>

<commit_message>
Mod 3,4,5 regenerated PDFs, updated screenshots
</commit_message>
<xml_diff>
--- a/05-faster_feedback_with_unit_testing.pptx
+++ b/05-faster_feedback_with_unit_testing.pptx
@@ -7237,14 +7237,14 @@
           </a:ln>
           <a:extLst>
             <a:ext uri="{909E8E84-426E-40dd-AFC4-6F175D3DCCD1}">
-              <a14:hiddenFill xmlns="" xmlns:a14="http://schemas.microsoft.com/office/drawing/2010/main">
+              <a14:hiddenFill xmlns:a14="http://schemas.microsoft.com/office/drawing/2010/main" xmlns="">
                 <a:solidFill>
                   <a:srgbClr val="FFFFFF"/>
                 </a:solidFill>
               </a14:hiddenFill>
             </a:ext>
             <a:ext uri="{91240B29-F687-4f45-9708-019B960494DF}">
-              <a14:hiddenLine xmlns="" xmlns:a14="http://schemas.microsoft.com/office/drawing/2010/main" w="9525">
+              <a14:hiddenLine xmlns:a14="http://schemas.microsoft.com/office/drawing/2010/main" xmlns="" w="9525">
                 <a:solidFill>
                   <a:srgbClr val="000000"/>
                 </a:solidFill>
@@ -7392,14 +7392,14 @@
           </a:ln>
           <a:extLst>
             <a:ext uri="{909E8E84-426E-40dd-AFC4-6F175D3DCCD1}">
-              <a14:hiddenFill xmlns="" xmlns:a14="http://schemas.microsoft.com/office/drawing/2010/main">
+              <a14:hiddenFill xmlns:a14="http://schemas.microsoft.com/office/drawing/2010/main" xmlns="">
                 <a:solidFill>
                   <a:srgbClr val="FFFFFF"/>
                 </a:solidFill>
               </a14:hiddenFill>
             </a:ext>
             <a:ext uri="{91240B29-F687-4f45-9708-019B960494DF}">
-              <a14:hiddenLine xmlns="" xmlns:a14="http://schemas.microsoft.com/office/drawing/2010/main" w="9525">
+              <a14:hiddenLine xmlns:a14="http://schemas.microsoft.com/office/drawing/2010/main" xmlns="" w="9525">
                 <a:solidFill>
                   <a:srgbClr val="000000"/>
                 </a:solidFill>
@@ -7890,14 +7890,14 @@
           </a:ln>
           <a:extLst>
             <a:ext uri="{909E8E84-426E-40dd-AFC4-6F175D3DCCD1}">
-              <a14:hiddenFill xmlns="" xmlns:a14="http://schemas.microsoft.com/office/drawing/2010/main">
+              <a14:hiddenFill xmlns:a14="http://schemas.microsoft.com/office/drawing/2010/main" xmlns="">
                 <a:solidFill>
                   <a:srgbClr val="FFFFFF"/>
                 </a:solidFill>
               </a14:hiddenFill>
             </a:ext>
             <a:ext uri="{91240B29-F687-4f45-9708-019B960494DF}">
-              <a14:hiddenLine xmlns="" xmlns:a14="http://schemas.microsoft.com/office/drawing/2010/main" w="9525">
+              <a14:hiddenLine xmlns:a14="http://schemas.microsoft.com/office/drawing/2010/main" xmlns="" w="9525">
                 <a:solidFill>
                   <a:srgbClr val="000000"/>
                 </a:solidFill>
@@ -9324,14 +9324,14 @@
           </a:ln>
           <a:extLst>
             <a:ext uri="{909E8E84-426E-40dd-AFC4-6F175D3DCCD1}">
-              <a14:hiddenFill xmlns="" xmlns:a14="http://schemas.microsoft.com/office/drawing/2010/main">
+              <a14:hiddenFill xmlns:a14="http://schemas.microsoft.com/office/drawing/2010/main" xmlns="">
                 <a:solidFill>
                   <a:srgbClr val="FFFFFF"/>
                 </a:solidFill>
               </a14:hiddenFill>
             </a:ext>
             <a:ext uri="{91240B29-F687-4f45-9708-019B960494DF}">
-              <a14:hiddenLine xmlns="" xmlns:a14="http://schemas.microsoft.com/office/drawing/2010/main" w="9525">
+              <a14:hiddenLine xmlns:a14="http://schemas.microsoft.com/office/drawing/2010/main" xmlns="" w="9525">
                 <a:solidFill>
                   <a:srgbClr val="000000"/>
                 </a:solidFill>
@@ -10665,14 +10665,14 @@
           </a:ln>
           <a:extLst>
             <a:ext uri="{909E8E84-426E-40dd-AFC4-6F175D3DCCD1}">
-              <a14:hiddenFill xmlns="" xmlns:a14="http://schemas.microsoft.com/office/drawing/2010/main">
+              <a14:hiddenFill xmlns:a14="http://schemas.microsoft.com/office/drawing/2010/main" xmlns="">
                 <a:solidFill>
                   <a:srgbClr val="FFFFFF"/>
                 </a:solidFill>
               </a14:hiddenFill>
             </a:ext>
             <a:ext uri="{91240B29-F687-4f45-9708-019B960494DF}">
-              <a14:hiddenLine xmlns="" xmlns:a14="http://schemas.microsoft.com/office/drawing/2010/main" w="9525">
+              <a14:hiddenLine xmlns:a14="http://schemas.microsoft.com/office/drawing/2010/main" xmlns="" w="9525">
                 <a:solidFill>
                   <a:srgbClr val="000000"/>
                 </a:solidFill>
@@ -11230,14 +11230,14 @@
           </a:ln>
           <a:extLst>
             <a:ext uri="{909E8E84-426E-40dd-AFC4-6F175D3DCCD1}">
-              <a14:hiddenFill xmlns="" xmlns:a14="http://schemas.microsoft.com/office/drawing/2010/main">
+              <a14:hiddenFill xmlns:a14="http://schemas.microsoft.com/office/drawing/2010/main" xmlns="">
                 <a:solidFill>
                   <a:srgbClr val="FFFFFF"/>
                 </a:solidFill>
               </a14:hiddenFill>
             </a:ext>
             <a:ext uri="{91240B29-F687-4f45-9708-019B960494DF}">
-              <a14:hiddenLine xmlns="" xmlns:a14="http://schemas.microsoft.com/office/drawing/2010/main" w="9525">
+              <a14:hiddenLine xmlns:a14="http://schemas.microsoft.com/office/drawing/2010/main" xmlns="" w="9525">
                 <a:solidFill>
                   <a:srgbClr val="000000"/>
                 </a:solidFill>
@@ -11804,14 +11804,14 @@
           </a:ln>
           <a:extLst>
             <a:ext uri="{909E8E84-426E-40dd-AFC4-6F175D3DCCD1}">
-              <a14:hiddenFill xmlns="" xmlns:a14="http://schemas.microsoft.com/office/drawing/2010/main">
+              <a14:hiddenFill xmlns:a14="http://schemas.microsoft.com/office/drawing/2010/main" xmlns="">
                 <a:solidFill>
                   <a:srgbClr val="FFFFFF"/>
                 </a:solidFill>
               </a14:hiddenFill>
             </a:ext>
             <a:ext uri="{91240B29-F687-4f45-9708-019B960494DF}">
-              <a14:hiddenLine xmlns="" xmlns:a14="http://schemas.microsoft.com/office/drawing/2010/main" w="9525">
+              <a14:hiddenLine xmlns:a14="http://schemas.microsoft.com/office/drawing/2010/main" xmlns="" w="9525">
                 <a:solidFill>
                   <a:srgbClr val="000000"/>
                 </a:solidFill>
@@ -12751,14 +12751,14 @@
           </a:ln>
           <a:extLst>
             <a:ext uri="{909E8E84-426E-40dd-AFC4-6F175D3DCCD1}">
-              <a14:hiddenFill xmlns="" xmlns:a14="http://schemas.microsoft.com/office/drawing/2010/main">
+              <a14:hiddenFill xmlns:a14="http://schemas.microsoft.com/office/drawing/2010/main" xmlns="">
                 <a:solidFill>
                   <a:srgbClr val="FFFFFF"/>
                 </a:solidFill>
               </a14:hiddenFill>
             </a:ext>
             <a:ext uri="{91240B29-F687-4f45-9708-019B960494DF}">
-              <a14:hiddenLine xmlns="" xmlns:a14="http://schemas.microsoft.com/office/drawing/2010/main" w="9525">
+              <a14:hiddenLine xmlns:a14="http://schemas.microsoft.com/office/drawing/2010/main" xmlns="" w="9525">
                 <a:solidFill>
                   <a:srgbClr val="000000"/>
                 </a:solidFill>
@@ -13513,14 +13513,14 @@
           </a:ln>
           <a:extLst>
             <a:ext uri="{909E8E84-426E-40dd-AFC4-6F175D3DCCD1}">
-              <a14:hiddenFill xmlns="" xmlns:a14="http://schemas.microsoft.com/office/drawing/2010/main">
+              <a14:hiddenFill xmlns:a14="http://schemas.microsoft.com/office/drawing/2010/main" xmlns="">
                 <a:solidFill>
                   <a:srgbClr val="FFFFFF"/>
                 </a:solidFill>
               </a14:hiddenFill>
             </a:ext>
             <a:ext uri="{91240B29-F687-4f45-9708-019B960494DF}">
-              <a14:hiddenLine xmlns="" xmlns:a14="http://schemas.microsoft.com/office/drawing/2010/main" w="9525">
+              <a14:hiddenLine xmlns:a14="http://schemas.microsoft.com/office/drawing/2010/main" xmlns="" w="9525">
                 <a:solidFill>
                   <a:srgbClr val="000000"/>
                 </a:solidFill>
@@ -31382,18 +31382,6 @@
 </file>
 
 <file path=customXml/item1.xml><?xml version="1.0" encoding="utf-8"?>
-<p:properties xmlns:p="http://schemas.microsoft.com/office/2006/metadata/properties" xmlns:xsi="http://www.w3.org/2001/XMLSchema-instance" xmlns:pc="http://schemas.microsoft.com/office/infopath/2007/PartnerControls">
-  <documentManagement>
-    <_dlc_DocId xmlns="7bb5d761-a2ea-4873-95f7-7a6658fb3ef0">M4CWTKMW727E-592-73</_dlc_DocId>
-    <_dlc_DocIdUrl xmlns="7bb5d761-a2ea-4873-95f7-7a6658fb3ef0">
-      <Url>https://kms.vci.local/marketing/team/_layouts/DocIdRedir.aspx?ID=M4CWTKMW727E-592-73</Url>
-      <Description>M4CWTKMW727E-592-73</Description>
-    </_dlc_DocIdUrl>
-  </documentManagement>
-</p:properties>
-</file>
-
-<file path=customXml/item2.xml><?xml version="1.0" encoding="utf-8"?>
 <ct:contentTypeSchema xmlns:ct="http://schemas.microsoft.com/office/2006/metadata/contentType" xmlns:ma="http://schemas.microsoft.com/office/2006/metadata/properties/metaAttributes" ct:_="" ma:_="" ma:contentTypeName="Document" ma:contentTypeID="0x0101000812F700BE7F874999720E88173FE491" ma:contentTypeVersion="0" ma:contentTypeDescription="Create a new document." ma:contentTypeScope="" ma:versionID="3f79f408e2ca720b7aba6e0e32464d0c">
   <xsd:schema xmlns:xsd="http://www.w3.org/2001/XMLSchema" xmlns:xs="http://www.w3.org/2001/XMLSchema" xmlns:p="http://schemas.microsoft.com/office/2006/metadata/properties" xmlns:ns2="7bb5d761-a2ea-4873-95f7-7a6658fb3ef0" targetNamespace="http://schemas.microsoft.com/office/2006/metadata/properties" ma:root="true" ma:fieldsID="1e062cd38ba31e406bfc4340fbc7f87a" ns2:_="">
     <xsd:import namespace="7bb5d761-a2ea-4873-95f7-7a6658fb3ef0"/>
@@ -31538,7 +31526,28 @@
 </ct:contentTypeSchema>
 </file>
 
+<file path=customXml/item2.xml><?xml version="1.0" encoding="utf-8"?>
+<p:properties xmlns:p="http://schemas.microsoft.com/office/2006/metadata/properties" xmlns:xsi="http://www.w3.org/2001/XMLSchema-instance" xmlns:pc="http://schemas.microsoft.com/office/infopath/2007/PartnerControls">
+  <documentManagement>
+    <_dlc_DocId xmlns="7bb5d761-a2ea-4873-95f7-7a6658fb3ef0">M4CWTKMW727E-592-73</_dlc_DocId>
+    <_dlc_DocIdUrl xmlns="7bb5d761-a2ea-4873-95f7-7a6658fb3ef0">
+      <Url>https://kms.vci.local/marketing/team/_layouts/DocIdRedir.aspx?ID=M4CWTKMW727E-592-73</Url>
+      <Description>M4CWTKMW727E-592-73</Description>
+    </_dlc_DocIdUrl>
+  </documentManagement>
+</p:properties>
+</file>
+
 <file path=customXml/item3.xml><?xml version="1.0" encoding="utf-8"?>
+<?mso-contentType ?>
+<FormTemplates xmlns="http://schemas.microsoft.com/sharepoint/v3/contenttype/forms">
+  <Display>DocumentLibraryForm</Display>
+  <Edit>DocumentLibraryForm</Edit>
+  <New>DocumentLibraryForm</New>
+</FormTemplates>
+</file>
+
+<file path=customXml/item4.xml><?xml version="1.0" encoding="utf-8"?>
 <?mso-contentType ?>
 <spe:Receivers xmlns:spe="http://schemas.microsoft.com/sharepoint/events">
   <Receiver>
@@ -31584,32 +31593,7 @@
 </spe:Receivers>
 </file>
 
-<file path=customXml/item4.xml><?xml version="1.0" encoding="utf-8"?>
-<?mso-contentType ?>
-<FormTemplates xmlns="http://schemas.microsoft.com/sharepoint/v3/contenttype/forms">
-  <Display>DocumentLibraryForm</Display>
-  <Edit>DocumentLibraryForm</Edit>
-  <New>DocumentLibraryForm</New>
-</FormTemplates>
-</file>
-
 <file path=customXml/itemProps1.xml><?xml version="1.0" encoding="utf-8"?>
-<ds:datastoreItem xmlns:ds="http://schemas.openxmlformats.org/officeDocument/2006/customXml" ds:itemID="{6921749B-AEB7-461B-845F-603CABD25259}">
-  <ds:schemaRefs>
-    <ds:schemaRef ds:uri="7bb5d761-a2ea-4873-95f7-7a6658fb3ef0"/>
-    <ds:schemaRef ds:uri="http://purl.org/dc/terms/"/>
-    <ds:schemaRef ds:uri="http://schemas.openxmlformats.org/package/2006/metadata/core-properties"/>
-    <ds:schemaRef ds:uri="http://purl.org/dc/dcmitype/"/>
-    <ds:schemaRef ds:uri="http://schemas.microsoft.com/office/2006/documentManagement/types"/>
-    <ds:schemaRef ds:uri="http://purl.org/dc/elements/1.1/"/>
-    <ds:schemaRef ds:uri="http://schemas.microsoft.com/office/2006/metadata/properties"/>
-    <ds:schemaRef ds:uri="http://schemas.microsoft.com/office/infopath/2007/PartnerControls"/>
-    <ds:schemaRef ds:uri="http://www.w3.org/XML/1998/namespace"/>
-  </ds:schemaRefs>
-</ds:datastoreItem>
-</file>
-
-<file path=customXml/itemProps2.xml><?xml version="1.0" encoding="utf-8"?>
 <ds:datastoreItem xmlns:ds="http://schemas.openxmlformats.org/officeDocument/2006/customXml" ds:itemID="{164479E5-0B02-49AC-B79E-EC1D6164DDD3}">
   <ds:schemaRefs>
     <ds:schemaRef ds:uri="http://schemas.microsoft.com/office/2006/metadata/contentType"/>
@@ -31627,18 +31611,34 @@
 </ds:datastoreItem>
 </file>
 
+<file path=customXml/itemProps2.xml><?xml version="1.0" encoding="utf-8"?>
+<ds:datastoreItem xmlns:ds="http://schemas.openxmlformats.org/officeDocument/2006/customXml" ds:itemID="{6921749B-AEB7-461B-845F-603CABD25259}">
+  <ds:schemaRefs>
+    <ds:schemaRef ds:uri="7bb5d761-a2ea-4873-95f7-7a6658fb3ef0"/>
+    <ds:schemaRef ds:uri="http://purl.org/dc/terms/"/>
+    <ds:schemaRef ds:uri="http://schemas.openxmlformats.org/package/2006/metadata/core-properties"/>
+    <ds:schemaRef ds:uri="http://purl.org/dc/dcmitype/"/>
+    <ds:schemaRef ds:uri="http://schemas.microsoft.com/office/2006/documentManagement/types"/>
+    <ds:schemaRef ds:uri="http://purl.org/dc/elements/1.1/"/>
+    <ds:schemaRef ds:uri="http://schemas.microsoft.com/office/2006/metadata/properties"/>
+    <ds:schemaRef ds:uri="http://schemas.microsoft.com/office/infopath/2007/PartnerControls"/>
+    <ds:schemaRef ds:uri="http://www.w3.org/XML/1998/namespace"/>
+  </ds:schemaRefs>
+</ds:datastoreItem>
+</file>
+
 <file path=customXml/itemProps3.xml><?xml version="1.0" encoding="utf-8"?>
+<ds:datastoreItem xmlns:ds="http://schemas.openxmlformats.org/officeDocument/2006/customXml" ds:itemID="{5CDEB364-43EC-4510-9881-539C2A3FCE9E}">
+  <ds:schemaRefs>
+    <ds:schemaRef ds:uri="http://schemas.microsoft.com/sharepoint/v3/contenttype/forms"/>
+  </ds:schemaRefs>
+</ds:datastoreItem>
+</file>
+
+<file path=customXml/itemProps4.xml><?xml version="1.0" encoding="utf-8"?>
 <ds:datastoreItem xmlns:ds="http://schemas.openxmlformats.org/officeDocument/2006/customXml" ds:itemID="{B13EBC30-FE27-4C6A-B723-23FC2188F7DC}">
   <ds:schemaRefs>
     <ds:schemaRef ds:uri="http://schemas.microsoft.com/sharepoint/events"/>
   </ds:schemaRefs>
 </ds:datastoreItem>
-</file>
-
-<file path=customXml/itemProps4.xml><?xml version="1.0" encoding="utf-8"?>
-<ds:datastoreItem xmlns:ds="http://schemas.openxmlformats.org/officeDocument/2006/customXml" ds:itemID="{5CDEB364-43EC-4510-9881-539C2A3FCE9E}">
-  <ds:schemaRefs>
-    <ds:schemaRef ds:uri="http://schemas.microsoft.com/sharepoint/v3/contenttype/forms"/>
-  </ds:schemaRefs>
-</ds:datastoreItem>
 </file>
</xml_diff>